<commit_message>
Added a couple of slides
</commit_message>
<xml_diff>
--- a/Programming Foundations.pptx
+++ b/Programming Foundations.pptx
@@ -5,7 +5,7 @@
     <p:sldMasterId id="2147483648" r:id="rId1"/>
   </p:sldMasterIdLst>
   <p:notesMasterIdLst>
-    <p:notesMasterId r:id="rId47"/>
+    <p:notesMasterId r:id="rId52"/>
   </p:notesMasterIdLst>
   <p:sldIdLst>
     <p:sldId id="256" r:id="rId2"/>
@@ -52,7 +52,12 @@
     <p:sldId id="294" r:id="rId43"/>
     <p:sldId id="296" r:id="rId44"/>
     <p:sldId id="295" r:id="rId45"/>
-    <p:sldId id="301" r:id="rId46"/>
+    <p:sldId id="302" r:id="rId46"/>
+    <p:sldId id="301" r:id="rId47"/>
+    <p:sldId id="303" r:id="rId48"/>
+    <p:sldId id="304" r:id="rId49"/>
+    <p:sldId id="305" r:id="rId50"/>
+    <p:sldId id="306" r:id="rId51"/>
   </p:sldIdLst>
   <p:sldSz cx="12192000" cy="6858000"/>
   <p:notesSz cx="6858000" cy="9144000"/>
@@ -212,7 +217,12 @@
             <p14:sldId id="294"/>
             <p14:sldId id="296"/>
             <p14:sldId id="295"/>
+            <p14:sldId id="302"/>
             <p14:sldId id="301"/>
+            <p14:sldId id="303"/>
+            <p14:sldId id="304"/>
+            <p14:sldId id="305"/>
+            <p14:sldId id="306"/>
           </p14:sldIdLst>
         </p14:section>
       </p14:sectionLst>
@@ -14613,11 +14623,7 @@
           <a:p>
             <a:r>
               <a:rPr lang="en-US" sz="3600" dirty="0" smtClean="0"/>
-              <a:t>The remaining text on that line will be </a:t>
-            </a:r>
-            <a:r>
-              <a:rPr lang="en-US" sz="3600" dirty="0" smtClean="0"/>
-              <a:t>ignored</a:t>
+              <a:t>The remaining text on that line will be ignored</a:t>
             </a:r>
           </a:p>
           <a:p>
@@ -17132,15 +17138,7 @@
                   <a:srgbClr val="C4A174"/>
                 </a:solidFill>
               </a:rPr>
-              <a:t>Exercise </a:t>
-            </a:r>
-            <a:r>
-              <a:rPr lang="en-US" dirty="0" smtClean="0">
-                <a:solidFill>
-                  <a:srgbClr val="C4A174"/>
-                </a:solidFill>
-              </a:rPr>
-              <a:t>2: </a:t>
+              <a:t>Exercise 2: </a:t>
             </a:r>
             <a:r>
               <a:rPr lang="en-US" dirty="0" smtClean="0"/>
@@ -17291,17 +17289,7 @@
                 <a:latin typeface="Courier New" panose="02070309020205020404" pitchFamily="49" charset="0"/>
                 <a:cs typeface="Courier New" panose="02070309020205020404" pitchFamily="49" charset="0"/>
               </a:rPr>
-              <a:t>&gt; </a:t>
-            </a:r>
-            <a:r>
-              <a:rPr lang="en-US" dirty="0" smtClean="0">
-                <a:solidFill>
-                  <a:schemeClr val="bg1"/>
-                </a:solidFill>
-                <a:latin typeface="Courier New" panose="02070309020205020404" pitchFamily="49" charset="0"/>
-                <a:cs typeface="Courier New" panose="02070309020205020404" pitchFamily="49" charset="0"/>
-              </a:rPr>
-              <a:t>python</a:t>
+              <a:t>&gt; python</a:t>
             </a:r>
             <a:endParaRPr lang="en-US" dirty="0">
               <a:solidFill>
@@ -17448,17 +17436,7 @@
                 <a:latin typeface="Courier New" panose="02070309020205020404" pitchFamily="49" charset="0"/>
                 <a:cs typeface="Courier New" panose="02070309020205020404" pitchFamily="49" charset="0"/>
               </a:rPr>
-              <a:t>&gt; </a:t>
-            </a:r>
-            <a:r>
-              <a:rPr lang="en-US" dirty="0" smtClean="0">
-                <a:solidFill>
-                  <a:schemeClr val="bg1"/>
-                </a:solidFill>
-                <a:latin typeface="Courier New" panose="02070309020205020404" pitchFamily="49" charset="0"/>
-                <a:cs typeface="Courier New" panose="02070309020205020404" pitchFamily="49" charset="0"/>
-              </a:rPr>
-              <a:t>python</a:t>
+              <a:t>&gt; python</a:t>
             </a:r>
             <a:endParaRPr lang="en-US" dirty="0">
               <a:solidFill>
@@ -17672,17 +17650,7 @@
                 <a:latin typeface="Courier New" panose="02070309020205020404" pitchFamily="49" charset="0"/>
                 <a:cs typeface="Courier New" panose="02070309020205020404" pitchFamily="49" charset="0"/>
               </a:rPr>
-              <a:t>&gt; </a:t>
-            </a:r>
-            <a:r>
-              <a:rPr lang="en-US" dirty="0" smtClean="0">
-                <a:solidFill>
-                  <a:schemeClr val="bg1"/>
-                </a:solidFill>
-                <a:latin typeface="Courier New" panose="02070309020205020404" pitchFamily="49" charset="0"/>
-                <a:cs typeface="Courier New" panose="02070309020205020404" pitchFamily="49" charset="0"/>
-              </a:rPr>
-              <a:t>python</a:t>
+              <a:t>&gt; python</a:t>
             </a:r>
             <a:endParaRPr lang="en-US" dirty="0">
               <a:solidFill>
@@ -20187,6 +20155,71 @@
       </p:grpSpPr>
       <p:sp>
         <p:nvSpPr>
+          <p:cNvPr id="2" name="Title 1"/>
+          <p:cNvSpPr>
+            <a:spLocks noGrp="1"/>
+          </p:cNvSpPr>
+          <p:nvPr>
+            <p:ph type="title"/>
+          </p:nvPr>
+        </p:nvSpPr>
+        <p:spPr/>
+        <p:txBody>
+          <a:bodyPr/>
+          <a:lstStyle/>
+          <a:p>
+            <a:r>
+              <a:rPr lang="en-US" dirty="0"/>
+              <a:t>Data Types and </a:t>
+            </a:r>
+            <a:r>
+              <a:rPr lang="en-US" dirty="0" smtClean="0"/>
+              <a:t>Variables</a:t>
+            </a:r>
+            <a:endParaRPr lang="en-US" dirty="0"/>
+          </a:p>
+        </p:txBody>
+      </p:sp>
+    </p:spTree>
+    <p:extLst>
+      <p:ext uri="{BB962C8B-B14F-4D97-AF65-F5344CB8AC3E}">
+        <p14:creationId xmlns:p14="http://schemas.microsoft.com/office/powerpoint/2010/main" val="827732725"/>
+      </p:ext>
+    </p:extLst>
+  </p:cSld>
+  <p:clrMapOvr>
+    <a:masterClrMapping/>
+  </p:clrMapOvr>
+</p:sld>
+</file>
+
+<file path=ppt/slides/slide46.xml><?xml version="1.0" encoding="utf-8"?>
+<p:sld xmlns:a="http://schemas.openxmlformats.org/drawingml/2006/main" xmlns:r="http://schemas.openxmlformats.org/officeDocument/2006/relationships" xmlns:p="http://schemas.openxmlformats.org/presentationml/2006/main">
+  <p:cSld>
+    <p:bg>
+      <p:bgPr>
+        <a:solidFill>
+          <a:schemeClr val="bg1"/>
+        </a:solidFill>
+        <a:effectLst/>
+      </p:bgPr>
+    </p:bg>
+    <p:spTree>
+      <p:nvGrpSpPr>
+        <p:cNvPr id="1" name=""/>
+        <p:cNvGrpSpPr/>
+        <p:nvPr/>
+      </p:nvGrpSpPr>
+      <p:grpSpPr>
+        <a:xfrm>
+          <a:off x="0" y="0"/>
+          <a:ext cx="0" cy="0"/>
+          <a:chOff x="0" y="0"/>
+          <a:chExt cx="0" cy="0"/>
+        </a:xfrm>
+      </p:grpSpPr>
+      <p:sp>
+        <p:nvSpPr>
           <p:cNvPr id="4" name="Content Placeholder 3"/>
           <p:cNvSpPr>
             <a:spLocks noGrp="1"/>
@@ -20200,7 +20233,35 @@
           <a:bodyPr/>
           <a:lstStyle/>
           <a:p>
-            <a:endParaRPr lang="en-US"/>
+            <a:r>
+              <a:rPr lang="en-US" dirty="0" smtClean="0"/>
+              <a:t>Numbers</a:t>
+            </a:r>
+          </a:p>
+          <a:p>
+            <a:r>
+              <a:rPr lang="en-US" dirty="0" smtClean="0"/>
+              <a:t>Strings</a:t>
+            </a:r>
+          </a:p>
+          <a:p>
+            <a:r>
+              <a:rPr lang="en-US" dirty="0" smtClean="0"/>
+              <a:t>Booleans</a:t>
+            </a:r>
+          </a:p>
+          <a:p>
+            <a:r>
+              <a:rPr lang="en-US" dirty="0" smtClean="0"/>
+              <a:t>Lists and Tuples</a:t>
+            </a:r>
+          </a:p>
+          <a:p>
+            <a:r>
+              <a:rPr lang="en-US" dirty="0" smtClean="0"/>
+              <a:t>Dictionaries</a:t>
+            </a:r>
+            <a:endParaRPr lang="en-US" dirty="0"/>
           </a:p>
         </p:txBody>
       </p:sp>
@@ -20219,7 +20280,11 @@
           <a:bodyPr/>
           <a:lstStyle/>
           <a:p>
-            <a:endParaRPr lang="en-US"/>
+            <a:r>
+              <a:rPr lang="en-US" dirty="0" smtClean="0"/>
+              <a:t>Data Types</a:t>
+            </a:r>
+            <a:endParaRPr lang="en-US" dirty="0"/>
           </a:p>
         </p:txBody>
       </p:sp>
@@ -20227,6 +20292,379 @@
     <p:extLst>
       <p:ext uri="{BB962C8B-B14F-4D97-AF65-F5344CB8AC3E}">
         <p14:creationId xmlns:p14="http://schemas.microsoft.com/office/powerpoint/2010/main" val="1092101472"/>
+      </p:ext>
+    </p:extLst>
+  </p:cSld>
+  <p:clrMapOvr>
+    <a:masterClrMapping/>
+  </p:clrMapOvr>
+  <p:timing>
+    <p:tnLst>
+      <p:par>
+        <p:cTn id="1" dur="indefinite" restart="never" nodeType="tmRoot"/>
+      </p:par>
+    </p:tnLst>
+  </p:timing>
+</p:sld>
+</file>
+
+<file path=ppt/slides/slide47.xml><?xml version="1.0" encoding="utf-8"?>
+<p:sld xmlns:a="http://schemas.openxmlformats.org/drawingml/2006/main" xmlns:r="http://schemas.openxmlformats.org/officeDocument/2006/relationships" xmlns:p="http://schemas.openxmlformats.org/presentationml/2006/main">
+  <p:cSld>
+    <p:bg>
+      <p:bgPr>
+        <a:solidFill>
+          <a:schemeClr val="bg1"/>
+        </a:solidFill>
+        <a:effectLst/>
+      </p:bgPr>
+    </p:bg>
+    <p:spTree>
+      <p:nvGrpSpPr>
+        <p:cNvPr id="1" name=""/>
+        <p:cNvGrpSpPr/>
+        <p:nvPr/>
+      </p:nvGrpSpPr>
+      <p:grpSpPr>
+        <a:xfrm>
+          <a:off x="0" y="0"/>
+          <a:ext cx="0" cy="0"/>
+          <a:chOff x="0" y="0"/>
+          <a:chExt cx="0" cy="0"/>
+        </a:xfrm>
+      </p:grpSpPr>
+      <p:sp>
+        <p:nvSpPr>
+          <p:cNvPr id="4" name="Content Placeholder 3"/>
+          <p:cNvSpPr>
+            <a:spLocks noGrp="1"/>
+          </p:cNvSpPr>
+          <p:nvPr>
+            <p:ph idx="1"/>
+          </p:nvPr>
+        </p:nvSpPr>
+        <p:spPr/>
+        <p:txBody>
+          <a:bodyPr/>
+          <a:lstStyle/>
+          <a:p>
+            <a:r>
+              <a:rPr lang="en-US" dirty="0" smtClean="0"/>
+              <a:t>Integer - </a:t>
+            </a:r>
+            <a:r>
+              <a:rPr lang="en-US" dirty="0" err="1" smtClean="0"/>
+              <a:t>int</a:t>
+            </a:r>
+            <a:r>
+              <a:rPr lang="en-US" dirty="0" smtClean="0"/>
+              <a:t>()</a:t>
+            </a:r>
+          </a:p>
+          <a:p>
+            <a:r>
+              <a:rPr lang="en-US" dirty="0" smtClean="0"/>
+              <a:t>Longs – long()</a:t>
+            </a:r>
+          </a:p>
+          <a:p>
+            <a:r>
+              <a:rPr lang="en-US" dirty="0" smtClean="0"/>
+              <a:t>Floats – float()</a:t>
+            </a:r>
+          </a:p>
+          <a:p>
+            <a:r>
+              <a:rPr lang="en-US" dirty="0" smtClean="0"/>
+              <a:t>Complex – complex()</a:t>
+            </a:r>
+            <a:endParaRPr lang="en-US" dirty="0"/>
+          </a:p>
+        </p:txBody>
+      </p:sp>
+      <p:sp>
+        <p:nvSpPr>
+          <p:cNvPr id="3" name="Title 2"/>
+          <p:cNvSpPr>
+            <a:spLocks noGrp="1"/>
+          </p:cNvSpPr>
+          <p:nvPr>
+            <p:ph type="title"/>
+          </p:nvPr>
+        </p:nvSpPr>
+        <p:spPr/>
+        <p:txBody>
+          <a:bodyPr/>
+          <a:lstStyle/>
+          <a:p>
+            <a:r>
+              <a:rPr lang="en-US" dirty="0" smtClean="0"/>
+              <a:t>Numbers</a:t>
+            </a:r>
+            <a:endParaRPr lang="en-US" dirty="0"/>
+          </a:p>
+        </p:txBody>
+      </p:sp>
+    </p:spTree>
+    <p:extLst>
+      <p:ext uri="{BB962C8B-B14F-4D97-AF65-F5344CB8AC3E}">
+        <p14:creationId xmlns:p14="http://schemas.microsoft.com/office/powerpoint/2010/main" val="3457724775"/>
+      </p:ext>
+    </p:extLst>
+  </p:cSld>
+  <p:clrMapOvr>
+    <a:masterClrMapping/>
+  </p:clrMapOvr>
+  <p:timing>
+    <p:tnLst>
+      <p:par>
+        <p:cTn id="1" dur="indefinite" restart="never" nodeType="tmRoot"/>
+      </p:par>
+    </p:tnLst>
+  </p:timing>
+</p:sld>
+</file>
+
+<file path=ppt/slides/slide48.xml><?xml version="1.0" encoding="utf-8"?>
+<p:sld xmlns:a="http://schemas.openxmlformats.org/drawingml/2006/main" xmlns:r="http://schemas.openxmlformats.org/officeDocument/2006/relationships" xmlns:p="http://schemas.openxmlformats.org/presentationml/2006/main">
+  <p:cSld>
+    <p:bg>
+      <p:bgPr>
+        <a:solidFill>
+          <a:schemeClr val="bg1"/>
+        </a:solidFill>
+        <a:effectLst/>
+      </p:bgPr>
+    </p:bg>
+    <p:spTree>
+      <p:nvGrpSpPr>
+        <p:cNvPr id="1" name=""/>
+        <p:cNvGrpSpPr/>
+        <p:nvPr/>
+      </p:nvGrpSpPr>
+      <p:grpSpPr>
+        <a:xfrm>
+          <a:off x="0" y="0"/>
+          <a:ext cx="0" cy="0"/>
+          <a:chOff x="0" y="0"/>
+          <a:chExt cx="0" cy="0"/>
+        </a:xfrm>
+      </p:grpSpPr>
+      <p:sp>
+        <p:nvSpPr>
+          <p:cNvPr id="4" name="Content Placeholder 3"/>
+          <p:cNvSpPr>
+            <a:spLocks noGrp="1"/>
+          </p:cNvSpPr>
+          <p:nvPr>
+            <p:ph idx="1"/>
+          </p:nvPr>
+        </p:nvSpPr>
+        <p:spPr/>
+        <p:txBody>
+          <a:bodyPr/>
+          <a:lstStyle/>
+          <a:p>
+            <a:r>
+              <a:rPr lang="en-US" dirty="0" smtClean="0"/>
+              <a:t>What is a string</a:t>
+            </a:r>
+          </a:p>
+          <a:p>
+            <a:r>
+              <a:rPr lang="en-US" dirty="0" smtClean="0"/>
+              <a:t>String manipulation</a:t>
+            </a:r>
+          </a:p>
+          <a:p>
+            <a:r>
+              <a:rPr lang="en-US" dirty="0" smtClean="0"/>
+              <a:t>String methods</a:t>
+            </a:r>
+            <a:endParaRPr lang="en-US" dirty="0"/>
+          </a:p>
+        </p:txBody>
+      </p:sp>
+      <p:sp>
+        <p:nvSpPr>
+          <p:cNvPr id="3" name="Title 2"/>
+          <p:cNvSpPr>
+            <a:spLocks noGrp="1"/>
+          </p:cNvSpPr>
+          <p:nvPr>
+            <p:ph type="title"/>
+          </p:nvPr>
+        </p:nvSpPr>
+        <p:spPr/>
+        <p:txBody>
+          <a:bodyPr/>
+          <a:lstStyle/>
+          <a:p>
+            <a:r>
+              <a:rPr lang="en-US" dirty="0" smtClean="0"/>
+              <a:t>Strings</a:t>
+            </a:r>
+            <a:endParaRPr lang="en-US" dirty="0"/>
+          </a:p>
+        </p:txBody>
+      </p:sp>
+    </p:spTree>
+    <p:extLst>
+      <p:ext uri="{BB962C8B-B14F-4D97-AF65-F5344CB8AC3E}">
+        <p14:creationId xmlns:p14="http://schemas.microsoft.com/office/powerpoint/2010/main" val="3730273466"/>
+      </p:ext>
+    </p:extLst>
+  </p:cSld>
+  <p:clrMapOvr>
+    <a:masterClrMapping/>
+  </p:clrMapOvr>
+  <p:timing>
+    <p:tnLst>
+      <p:par>
+        <p:cTn id="1" dur="indefinite" restart="never" nodeType="tmRoot"/>
+      </p:par>
+    </p:tnLst>
+  </p:timing>
+</p:sld>
+</file>
+
+<file path=ppt/slides/slide49.xml><?xml version="1.0" encoding="utf-8"?>
+<p:sld xmlns:a="http://schemas.openxmlformats.org/drawingml/2006/main" xmlns:r="http://schemas.openxmlformats.org/officeDocument/2006/relationships" xmlns:p="http://schemas.openxmlformats.org/presentationml/2006/main">
+  <p:cSld>
+    <p:bg>
+      <p:bgPr>
+        <a:solidFill>
+          <a:schemeClr val="bg1"/>
+        </a:solidFill>
+        <a:effectLst/>
+      </p:bgPr>
+    </p:bg>
+    <p:spTree>
+      <p:nvGrpSpPr>
+        <p:cNvPr id="1" name=""/>
+        <p:cNvGrpSpPr/>
+        <p:nvPr/>
+      </p:nvGrpSpPr>
+      <p:grpSpPr>
+        <a:xfrm>
+          <a:off x="0" y="0"/>
+          <a:ext cx="0" cy="0"/>
+          <a:chOff x="0" y="0"/>
+          <a:chExt cx="0" cy="0"/>
+        </a:xfrm>
+      </p:grpSpPr>
+      <p:sp>
+        <p:nvSpPr>
+          <p:cNvPr id="4" name="Content Placeholder 3"/>
+          <p:cNvSpPr>
+            <a:spLocks noGrp="1"/>
+          </p:cNvSpPr>
+          <p:nvPr>
+            <p:ph idx="1"/>
+          </p:nvPr>
+        </p:nvSpPr>
+        <p:spPr/>
+        <p:txBody>
+          <a:bodyPr>
+            <a:normAutofit/>
+          </a:bodyPr>
+          <a:lstStyle/>
+          <a:p>
+            <a:r>
+              <a:rPr lang="en-US" dirty="0" smtClean="0"/>
+              <a:t>True or False?</a:t>
+            </a:r>
+          </a:p>
+          <a:p>
+            <a:pPr lvl="1"/>
+            <a:r>
+              <a:rPr lang="en-US" dirty="0" smtClean="0"/>
+              <a:t>The following values are considered False in Python:</a:t>
+            </a:r>
+          </a:p>
+          <a:p>
+            <a:pPr lvl="2"/>
+            <a:r>
+              <a:rPr lang="en-US" sz="2000" dirty="0" smtClean="0"/>
+              <a:t>None</a:t>
+            </a:r>
+          </a:p>
+          <a:p>
+            <a:pPr lvl="2"/>
+            <a:r>
+              <a:rPr lang="en-US" sz="2000" dirty="0" smtClean="0"/>
+              <a:t>False</a:t>
+            </a:r>
+          </a:p>
+          <a:p>
+            <a:pPr lvl="2"/>
+            <a:r>
+              <a:rPr lang="en-US" sz="2000" dirty="0" smtClean="0"/>
+              <a:t>Zero of any numeric type, e.g. 0, 0L, 0.0, 0j</a:t>
+            </a:r>
+          </a:p>
+          <a:p>
+            <a:pPr lvl="2"/>
+            <a:r>
+              <a:rPr lang="en-US" sz="2000" dirty="0" smtClean="0"/>
+              <a:t>Any empty sequence, e.g. ‘’,(),[]</a:t>
+            </a:r>
+          </a:p>
+          <a:p>
+            <a:pPr lvl="2"/>
+            <a:r>
+              <a:rPr lang="en-US" sz="2000" dirty="0" smtClean="0"/>
+              <a:t>Any empty mapping, e.g. {}</a:t>
+            </a:r>
+          </a:p>
+          <a:p>
+            <a:pPr lvl="1"/>
+            <a:r>
+              <a:rPr lang="en-US" dirty="0" smtClean="0"/>
+              <a:t>All other values are considered True</a:t>
+            </a:r>
+            <a:endParaRPr lang="en-US" dirty="0" smtClean="0"/>
+          </a:p>
+          <a:p>
+            <a:r>
+              <a:rPr lang="en-US" smtClean="0"/>
+              <a:t>Useage </a:t>
+            </a:r>
+            <a:r>
+              <a:rPr lang="en-US" dirty="0" smtClean="0"/>
+              <a:t>in expressions</a:t>
+            </a:r>
+            <a:endParaRPr lang="en-US" dirty="0"/>
+          </a:p>
+        </p:txBody>
+      </p:sp>
+      <p:sp>
+        <p:nvSpPr>
+          <p:cNvPr id="3" name="Title 2"/>
+          <p:cNvSpPr>
+            <a:spLocks noGrp="1"/>
+          </p:cNvSpPr>
+          <p:nvPr>
+            <p:ph type="title"/>
+          </p:nvPr>
+        </p:nvSpPr>
+        <p:spPr/>
+        <p:txBody>
+          <a:bodyPr/>
+          <a:lstStyle/>
+          <a:p>
+            <a:r>
+              <a:rPr lang="en-US" dirty="0" smtClean="0"/>
+              <a:t>Booleans</a:t>
+            </a:r>
+            <a:endParaRPr lang="en-US" dirty="0"/>
+          </a:p>
+        </p:txBody>
+      </p:sp>
+    </p:spTree>
+    <p:extLst>
+      <p:ext uri="{BB962C8B-B14F-4D97-AF65-F5344CB8AC3E}">
+        <p14:creationId xmlns:p14="http://schemas.microsoft.com/office/powerpoint/2010/main" val="2663023457"/>
       </p:ext>
     </p:extLst>
   </p:cSld>
@@ -20344,6 +20782,89 @@
     <p:extLst>
       <p:ext uri="{BB962C8B-B14F-4D97-AF65-F5344CB8AC3E}">
         <p14:creationId xmlns:p14="http://schemas.microsoft.com/office/powerpoint/2010/main" val="2512813680"/>
+      </p:ext>
+    </p:extLst>
+  </p:cSld>
+  <p:clrMapOvr>
+    <a:masterClrMapping/>
+  </p:clrMapOvr>
+  <p:timing>
+    <p:tnLst>
+      <p:par>
+        <p:cTn id="1" dur="indefinite" restart="never" nodeType="tmRoot"/>
+      </p:par>
+    </p:tnLst>
+  </p:timing>
+</p:sld>
+</file>
+
+<file path=ppt/slides/slide50.xml><?xml version="1.0" encoding="utf-8"?>
+<p:sld xmlns:a="http://schemas.openxmlformats.org/drawingml/2006/main" xmlns:r="http://schemas.openxmlformats.org/officeDocument/2006/relationships" xmlns:p="http://schemas.openxmlformats.org/presentationml/2006/main">
+  <p:cSld>
+    <p:bg>
+      <p:bgPr>
+        <a:solidFill>
+          <a:schemeClr val="bg1"/>
+        </a:solidFill>
+        <a:effectLst/>
+      </p:bgPr>
+    </p:bg>
+    <p:spTree>
+      <p:nvGrpSpPr>
+        <p:cNvPr id="1" name=""/>
+        <p:cNvGrpSpPr/>
+        <p:nvPr/>
+      </p:nvGrpSpPr>
+      <p:grpSpPr>
+        <a:xfrm>
+          <a:off x="0" y="0"/>
+          <a:ext cx="0" cy="0"/>
+          <a:chOff x="0" y="0"/>
+          <a:chExt cx="0" cy="0"/>
+        </a:xfrm>
+      </p:grpSpPr>
+      <p:sp>
+        <p:nvSpPr>
+          <p:cNvPr id="4" name="Content Placeholder 3"/>
+          <p:cNvSpPr>
+            <a:spLocks noGrp="1"/>
+          </p:cNvSpPr>
+          <p:nvPr>
+            <p:ph idx="1"/>
+          </p:nvPr>
+        </p:nvSpPr>
+        <p:spPr/>
+        <p:txBody>
+          <a:bodyPr/>
+          <a:lstStyle/>
+          <a:p>
+            <a:endParaRPr lang="en-US" dirty="0"/>
+          </a:p>
+        </p:txBody>
+      </p:sp>
+      <p:sp>
+        <p:nvSpPr>
+          <p:cNvPr id="3" name="Title 2"/>
+          <p:cNvSpPr>
+            <a:spLocks noGrp="1"/>
+          </p:cNvSpPr>
+          <p:nvPr>
+            <p:ph type="title"/>
+          </p:nvPr>
+        </p:nvSpPr>
+        <p:spPr/>
+        <p:txBody>
+          <a:bodyPr/>
+          <a:lstStyle/>
+          <a:p>
+            <a:endParaRPr lang="en-US"/>
+          </a:p>
+        </p:txBody>
+      </p:sp>
+    </p:spTree>
+    <p:extLst>
+      <p:ext uri="{BB962C8B-B14F-4D97-AF65-F5344CB8AC3E}">
+        <p14:creationId xmlns:p14="http://schemas.microsoft.com/office/powerpoint/2010/main" val="3718321057"/>
       </p:ext>
     </p:extLst>
   </p:cSld>
@@ -20420,11 +20941,7 @@
           <a:p>
             <a:r>
               <a:rPr lang="en-US" sz="4000" dirty="0" smtClean="0"/>
-              <a:t>Ask </a:t>
-            </a:r>
-            <a:r>
-              <a:rPr lang="en-US" sz="4000" dirty="0" smtClean="0"/>
-              <a:t>questions</a:t>
+              <a:t>Ask questions</a:t>
             </a:r>
           </a:p>
           <a:p>

</xml_diff>

<commit_message>
Operators Pt 2 and Libs slides
</commit_message>
<xml_diff>
--- a/Programming Foundations.pptx
+++ b/Programming Foundations.pptx
@@ -5,7 +5,7 @@
     <p:sldMasterId id="2147483648" r:id="rId1"/>
   </p:sldMasterIdLst>
   <p:notesMasterIdLst>
-    <p:notesMasterId r:id="rId68"/>
+    <p:notesMasterId r:id="rId75"/>
   </p:notesMasterIdLst>
   <p:sldIdLst>
     <p:sldId id="256" r:id="rId2"/>
@@ -72,8 +72,15 @@
     <p:sldId id="314" r:id="rId63"/>
     <p:sldId id="315" r:id="rId64"/>
     <p:sldId id="316" r:id="rId65"/>
-    <p:sldId id="317" r:id="rId66"/>
-    <p:sldId id="322" r:id="rId67"/>
+    <p:sldId id="324" r:id="rId66"/>
+    <p:sldId id="317" r:id="rId67"/>
+    <p:sldId id="322" r:id="rId68"/>
+    <p:sldId id="323" r:id="rId69"/>
+    <p:sldId id="325" r:id="rId70"/>
+    <p:sldId id="326" r:id="rId71"/>
+    <p:sldId id="327" r:id="rId72"/>
+    <p:sldId id="329" r:id="rId73"/>
+    <p:sldId id="328" r:id="rId74"/>
   </p:sldIdLst>
   <p:sldSz cx="12192000" cy="6858000"/>
   <p:notesSz cx="6858000" cy="9144000"/>
@@ -253,8 +260,15 @@
             <p14:sldId id="314"/>
             <p14:sldId id="315"/>
             <p14:sldId id="316"/>
+            <p14:sldId id="324"/>
             <p14:sldId id="317"/>
             <p14:sldId id="322"/>
+            <p14:sldId id="323"/>
+            <p14:sldId id="325"/>
+            <p14:sldId id="326"/>
+            <p14:sldId id="327"/>
+            <p14:sldId id="329"/>
+            <p14:sldId id="328"/>
           </p14:sldIdLst>
         </p14:section>
       </p14:sectionLst>
@@ -1232,6 +1246,141 @@
     <p:extLst>
       <p:ext uri="{BB962C8B-B14F-4D97-AF65-F5344CB8AC3E}">
         <p14:creationId xmlns:p14="http://schemas.microsoft.com/office/powerpoint/2010/main" val="3349135495"/>
+      </p:ext>
+    </p:extLst>
+  </p:cSld>
+  <p:clrMapOvr>
+    <a:masterClrMapping/>
+  </p:clrMapOvr>
+</p:notes>
+</file>
+
+<file path=ppt/notesSlides/notesSlide14.xml><?xml version="1.0" encoding="utf-8"?>
+<p:notes xmlns:a="http://schemas.openxmlformats.org/drawingml/2006/main" xmlns:r="http://schemas.openxmlformats.org/officeDocument/2006/relationships" xmlns:p="http://schemas.openxmlformats.org/presentationml/2006/main">
+  <p:cSld>
+    <p:spTree>
+      <p:nvGrpSpPr>
+        <p:cNvPr id="1" name=""/>
+        <p:cNvGrpSpPr/>
+        <p:nvPr/>
+      </p:nvGrpSpPr>
+      <p:grpSpPr>
+        <a:xfrm>
+          <a:off x="0" y="0"/>
+          <a:ext cx="0" cy="0"/>
+          <a:chOff x="0" y="0"/>
+          <a:chExt cx="0" cy="0"/>
+        </a:xfrm>
+      </p:grpSpPr>
+      <p:sp>
+        <p:nvSpPr>
+          <p:cNvPr id="2" name="Slide Image Placeholder 1"/>
+          <p:cNvSpPr>
+            <a:spLocks noGrp="1" noRot="1" noChangeAspect="1"/>
+          </p:cNvSpPr>
+          <p:nvPr>
+            <p:ph type="sldImg"/>
+          </p:nvPr>
+        </p:nvSpPr>
+        <p:spPr/>
+      </p:sp>
+      <p:sp>
+        <p:nvSpPr>
+          <p:cNvPr id="3" name="Notes Placeholder 2"/>
+          <p:cNvSpPr>
+            <a:spLocks noGrp="1"/>
+          </p:cNvSpPr>
+          <p:nvPr>
+            <p:ph type="body" idx="1"/>
+          </p:nvPr>
+        </p:nvSpPr>
+        <p:spPr/>
+        <p:txBody>
+          <a:bodyPr/>
+          <a:lstStyle/>
+          <a:p>
+            <a:r>
+              <a:rPr lang="en-US" b="1" dirty="0" smtClean="0"/>
+              <a:t>Exercise</a:t>
+            </a:r>
+            <a:r>
+              <a:rPr lang="en-US" b="1" baseline="0" dirty="0" smtClean="0"/>
+              <a:t> – Mathematical Operations</a:t>
+            </a:r>
+          </a:p>
+          <a:p>
+            <a:endParaRPr lang="en-GB" b="1" baseline="0" dirty="0" smtClean="0"/>
+          </a:p>
+          <a:p>
+            <a:r>
+              <a:rPr lang="en-GB" b="0" baseline="0" dirty="0" smtClean="0">
+                <a:solidFill>
+                  <a:srgbClr val="FF0000"/>
+                </a:solidFill>
+              </a:rPr>
+              <a:t>Design an exercise where the delegates build upon the user of the input and </a:t>
+            </a:r>
+            <a:r>
+              <a:rPr lang="en-GB" b="0" baseline="0" dirty="0" err="1" smtClean="0">
+                <a:solidFill>
+                  <a:srgbClr val="FF0000"/>
+                </a:solidFill>
+              </a:rPr>
+              <a:t>raw_input</a:t>
+            </a:r>
+            <a:r>
+              <a:rPr lang="en-GB" b="0" baseline="0" dirty="0" smtClean="0">
+                <a:solidFill>
+                  <a:srgbClr val="FF0000"/>
+                </a:solidFill>
+              </a:rPr>
+              <a:t> functions to take input and build a calculator or something.</a:t>
+            </a:r>
+          </a:p>
+          <a:p>
+            <a:endParaRPr lang="en-US" dirty="0" smtClean="0"/>
+          </a:p>
+          <a:p>
+            <a:endParaRPr lang="en-US" dirty="0"/>
+          </a:p>
+        </p:txBody>
+      </p:sp>
+      <p:sp>
+        <p:nvSpPr>
+          <p:cNvPr id="4" name="Slide Number Placeholder 3"/>
+          <p:cNvSpPr>
+            <a:spLocks noGrp="1"/>
+          </p:cNvSpPr>
+          <p:nvPr>
+            <p:ph type="sldNum" sz="quarter" idx="10"/>
+          </p:nvPr>
+        </p:nvSpPr>
+        <p:spPr/>
+        <p:txBody>
+          <a:bodyPr/>
+          <a:lstStyle/>
+          <a:p>
+            <a:fld id="{D2FD33D1-5F8B-45B7-9940-CBFFF9C06F51}" type="slidenum">
+              <a:rPr lang="en-GB" smtClean="0">
+                <a:solidFill>
+                  <a:prstClr val="black"/>
+                </a:solidFill>
+              </a:rPr>
+              <a:pPr/>
+              <a:t>65</a:t>
+            </a:fld>
+            <a:endParaRPr lang="en-GB" dirty="0">
+              <a:solidFill>
+                <a:prstClr val="black"/>
+              </a:solidFill>
+            </a:endParaRPr>
+          </a:p>
+        </p:txBody>
+      </p:sp>
+    </p:spTree>
+    <p:extLst>
+      <p:ext uri="{BB962C8B-B14F-4D97-AF65-F5344CB8AC3E}">
+        <p14:creationId xmlns:p14="http://schemas.microsoft.com/office/powerpoint/2010/main" val="1019159918"/>
       </p:ext>
     </p:extLst>
   </p:cSld>
@@ -22968,14 +23117,6 @@
 <file path=ppt/slides/slide65.xml><?xml version="1.0" encoding="utf-8"?>
 <p:sld xmlns:a="http://schemas.openxmlformats.org/drawingml/2006/main" xmlns:r="http://schemas.openxmlformats.org/officeDocument/2006/relationships" xmlns:p="http://schemas.openxmlformats.org/presentationml/2006/main">
   <p:cSld>
-    <p:bg>
-      <p:bgPr>
-        <a:solidFill>
-          <a:schemeClr val="bg1"/>
-        </a:solidFill>
-        <a:effectLst/>
-      </p:bgPr>
-    </p:bg>
     <p:spTree>
       <p:nvGrpSpPr>
         <p:cNvPr id="1" name=""/>
@@ -22992,26 +23133,7 @@
       </p:grpSpPr>
       <p:sp>
         <p:nvSpPr>
-          <p:cNvPr id="4" name="Content Placeholder 3"/>
-          <p:cNvSpPr>
-            <a:spLocks noGrp="1"/>
-          </p:cNvSpPr>
-          <p:nvPr>
-            <p:ph idx="1"/>
-          </p:nvPr>
-        </p:nvSpPr>
-        <p:spPr/>
-        <p:txBody>
-          <a:bodyPr/>
-          <a:lstStyle/>
-          <a:p>
-            <a:endParaRPr lang="en-US" dirty="0"/>
-          </a:p>
-        </p:txBody>
-      </p:sp>
-      <p:sp>
-        <p:nvSpPr>
-          <p:cNvPr id="3" name="Title 2"/>
+          <p:cNvPr id="4" name="Title 3"/>
           <p:cNvSpPr>
             <a:spLocks noGrp="1"/>
           </p:cNvSpPr>
@@ -23021,17 +23143,35 @@
         </p:nvSpPr>
         <p:spPr/>
         <p:txBody>
-          <a:bodyPr/>
+          <a:bodyPr>
+            <a:normAutofit/>
+          </a:bodyPr>
           <a:lstStyle/>
           <a:p>
-            <a:endParaRPr lang="en-US"/>
+            <a:r>
+              <a:rPr lang="en-US" dirty="0" smtClean="0">
+                <a:solidFill>
+                  <a:srgbClr val="C4A174"/>
+                </a:solidFill>
+              </a:rPr>
+              <a:t>Exercise:</a:t>
+            </a:r>
+            <a:r>
+              <a:rPr lang="en-US" dirty="0" smtClean="0"/>
+              <a:t> </a:t>
+            </a:r>
+            <a:r>
+              <a:rPr lang="en-US" dirty="0" smtClean="0"/>
+              <a:t>Data Types</a:t>
+            </a:r>
+            <a:endParaRPr lang="en-US" dirty="0"/>
           </a:p>
         </p:txBody>
       </p:sp>
     </p:spTree>
     <p:extLst>
       <p:ext uri="{BB962C8B-B14F-4D97-AF65-F5344CB8AC3E}">
-        <p14:creationId xmlns:p14="http://schemas.microsoft.com/office/powerpoint/2010/main" val="3933252123"/>
+        <p14:creationId xmlns:p14="http://schemas.microsoft.com/office/powerpoint/2010/main" val="3767105570"/>
       </p:ext>
     </p:extLst>
   </p:cSld>
@@ -23088,6 +23228,30 @@
           <a:bodyPr/>
           <a:lstStyle/>
           <a:p>
+            <a:r>
+              <a:rPr lang="en-US" dirty="0" smtClean="0"/>
+              <a:t>Membership</a:t>
+            </a:r>
+          </a:p>
+          <a:p>
+            <a:pPr lvl="1"/>
+            <a:r>
+              <a:rPr lang="en-US" dirty="0" smtClean="0"/>
+              <a:t>in, not in</a:t>
+            </a:r>
+          </a:p>
+          <a:p>
+            <a:r>
+              <a:rPr lang="en-US" dirty="0" smtClean="0"/>
+              <a:t>Identity</a:t>
+            </a:r>
+          </a:p>
+          <a:p>
+            <a:pPr lvl="1"/>
+            <a:r>
+              <a:rPr lang="en-US" dirty="0" smtClean="0"/>
+              <a:t>is, is not</a:t>
+            </a:r>
             <a:endParaRPr lang="en-US" dirty="0"/>
           </a:p>
         </p:txBody>
@@ -23107,7 +23271,132 @@
           <a:bodyPr/>
           <a:lstStyle/>
           <a:p>
-            <a:endParaRPr lang="en-US"/>
+            <a:r>
+              <a:rPr lang="en-US" dirty="0" smtClean="0"/>
+              <a:t>Operators Part 2</a:t>
+            </a:r>
+            <a:endParaRPr lang="en-US" dirty="0"/>
+          </a:p>
+        </p:txBody>
+      </p:sp>
+    </p:spTree>
+    <p:extLst>
+      <p:ext uri="{BB962C8B-B14F-4D97-AF65-F5344CB8AC3E}">
+        <p14:creationId xmlns:p14="http://schemas.microsoft.com/office/powerpoint/2010/main" val="3933252123"/>
+      </p:ext>
+    </p:extLst>
+  </p:cSld>
+  <p:clrMapOvr>
+    <a:masterClrMapping/>
+  </p:clrMapOvr>
+  <p:timing>
+    <p:tnLst>
+      <p:par>
+        <p:cTn id="1" dur="indefinite" restart="never" nodeType="tmRoot"/>
+      </p:par>
+    </p:tnLst>
+  </p:timing>
+</p:sld>
+</file>
+
+<file path=ppt/slides/slide67.xml><?xml version="1.0" encoding="utf-8"?>
+<p:sld xmlns:a="http://schemas.openxmlformats.org/drawingml/2006/main" xmlns:r="http://schemas.openxmlformats.org/officeDocument/2006/relationships" xmlns:p="http://schemas.openxmlformats.org/presentationml/2006/main">
+  <p:cSld>
+    <p:bg>
+      <p:bgPr>
+        <a:solidFill>
+          <a:schemeClr val="bg1"/>
+        </a:solidFill>
+        <a:effectLst/>
+      </p:bgPr>
+    </p:bg>
+    <p:spTree>
+      <p:nvGrpSpPr>
+        <p:cNvPr id="1" name=""/>
+        <p:cNvGrpSpPr/>
+        <p:nvPr/>
+      </p:nvGrpSpPr>
+      <p:grpSpPr>
+        <a:xfrm>
+          <a:off x="0" y="0"/>
+          <a:ext cx="0" cy="0"/>
+          <a:chOff x="0" y="0"/>
+          <a:chExt cx="0" cy="0"/>
+        </a:xfrm>
+      </p:grpSpPr>
+      <p:sp>
+        <p:nvSpPr>
+          <p:cNvPr id="4" name="Content Placeholder 3"/>
+          <p:cNvSpPr>
+            <a:spLocks noGrp="1"/>
+          </p:cNvSpPr>
+          <p:nvPr>
+            <p:ph idx="1"/>
+          </p:nvPr>
+        </p:nvSpPr>
+        <p:spPr/>
+        <p:txBody>
+          <a:bodyPr/>
+          <a:lstStyle/>
+          <a:p>
+            <a:r>
+              <a:rPr lang="en-US" dirty="0" smtClean="0"/>
+              <a:t>Test for membership in strings, lists or tuples</a:t>
+            </a:r>
+          </a:p>
+          <a:p>
+            <a:r>
+              <a:rPr lang="en-US" dirty="0"/>
+              <a:t>i</a:t>
+            </a:r>
+            <a:r>
+              <a:rPr lang="en-US" dirty="0" smtClean="0"/>
+              <a:t>n</a:t>
+            </a:r>
+          </a:p>
+          <a:p>
+            <a:pPr lvl="1"/>
+            <a:r>
+              <a:rPr lang="en-US" dirty="0" smtClean="0"/>
+              <a:t>True if it finds a variable in the specified sequence, otherwise False</a:t>
+            </a:r>
+          </a:p>
+          <a:p>
+            <a:r>
+              <a:rPr lang="en-US" dirty="0" smtClean="0"/>
+              <a:t>not in</a:t>
+            </a:r>
+          </a:p>
+          <a:p>
+            <a:pPr lvl="1"/>
+            <a:r>
+              <a:rPr lang="en-US" dirty="0" smtClean="0"/>
+              <a:t>True if it does not find a variable in the specified sequence, otherwise False</a:t>
+            </a:r>
+            <a:endParaRPr lang="en-US" dirty="0"/>
+          </a:p>
+        </p:txBody>
+      </p:sp>
+      <p:sp>
+        <p:nvSpPr>
+          <p:cNvPr id="3" name="Title 2"/>
+          <p:cNvSpPr>
+            <a:spLocks noGrp="1"/>
+          </p:cNvSpPr>
+          <p:nvPr>
+            <p:ph type="title"/>
+          </p:nvPr>
+        </p:nvSpPr>
+        <p:spPr/>
+        <p:txBody>
+          <a:bodyPr/>
+          <a:lstStyle/>
+          <a:p>
+            <a:r>
+              <a:rPr lang="en-US" dirty="0" smtClean="0"/>
+              <a:t>Membership Operators</a:t>
+            </a:r>
+            <a:endParaRPr lang="en-US" dirty="0"/>
           </a:p>
         </p:txBody>
       </p:sp>
@@ -23115,6 +23404,219 @@
     <p:extLst>
       <p:ext uri="{BB962C8B-B14F-4D97-AF65-F5344CB8AC3E}">
         <p14:creationId xmlns:p14="http://schemas.microsoft.com/office/powerpoint/2010/main" val="663500974"/>
+      </p:ext>
+    </p:extLst>
+  </p:cSld>
+  <p:clrMapOvr>
+    <a:masterClrMapping/>
+  </p:clrMapOvr>
+  <p:timing>
+    <p:tnLst>
+      <p:par>
+        <p:cTn id="1" dur="indefinite" restart="never" nodeType="tmRoot"/>
+      </p:par>
+    </p:tnLst>
+  </p:timing>
+</p:sld>
+</file>
+
+<file path=ppt/slides/slide68.xml><?xml version="1.0" encoding="utf-8"?>
+<p:sld xmlns:a="http://schemas.openxmlformats.org/drawingml/2006/main" xmlns:r="http://schemas.openxmlformats.org/officeDocument/2006/relationships" xmlns:p="http://schemas.openxmlformats.org/presentationml/2006/main">
+  <p:cSld>
+    <p:bg>
+      <p:bgPr>
+        <a:solidFill>
+          <a:schemeClr val="bg1"/>
+        </a:solidFill>
+        <a:effectLst/>
+      </p:bgPr>
+    </p:bg>
+    <p:spTree>
+      <p:nvGrpSpPr>
+        <p:cNvPr id="1" name=""/>
+        <p:cNvGrpSpPr/>
+        <p:nvPr/>
+      </p:nvGrpSpPr>
+      <p:grpSpPr>
+        <a:xfrm>
+          <a:off x="0" y="0"/>
+          <a:ext cx="0" cy="0"/>
+          <a:chOff x="0" y="0"/>
+          <a:chExt cx="0" cy="0"/>
+        </a:xfrm>
+      </p:grpSpPr>
+      <p:sp>
+        <p:nvSpPr>
+          <p:cNvPr id="4" name="Content Placeholder 3"/>
+          <p:cNvSpPr>
+            <a:spLocks noGrp="1"/>
+          </p:cNvSpPr>
+          <p:nvPr>
+            <p:ph idx="1"/>
+          </p:nvPr>
+        </p:nvSpPr>
+        <p:spPr/>
+        <p:txBody>
+          <a:bodyPr/>
+          <a:lstStyle/>
+          <a:p>
+            <a:endParaRPr lang="en-US" dirty="0"/>
+          </a:p>
+        </p:txBody>
+      </p:sp>
+      <p:sp>
+        <p:nvSpPr>
+          <p:cNvPr id="3" name="Title 2"/>
+          <p:cNvSpPr>
+            <a:spLocks noGrp="1"/>
+          </p:cNvSpPr>
+          <p:nvPr>
+            <p:ph type="title"/>
+          </p:nvPr>
+        </p:nvSpPr>
+        <p:spPr/>
+        <p:txBody>
+          <a:bodyPr/>
+          <a:lstStyle/>
+          <a:p>
+            <a:r>
+              <a:rPr lang="en-US" dirty="0" smtClean="0"/>
+              <a:t>Membership: Examples</a:t>
+            </a:r>
+            <a:endParaRPr lang="en-US" dirty="0"/>
+          </a:p>
+        </p:txBody>
+      </p:sp>
+    </p:spTree>
+    <p:extLst>
+      <p:ext uri="{BB962C8B-B14F-4D97-AF65-F5344CB8AC3E}">
+        <p14:creationId xmlns:p14="http://schemas.microsoft.com/office/powerpoint/2010/main" val="2909336299"/>
+      </p:ext>
+    </p:extLst>
+  </p:cSld>
+  <p:clrMapOvr>
+    <a:masterClrMapping/>
+  </p:clrMapOvr>
+  <p:timing>
+    <p:tnLst>
+      <p:par>
+        <p:cTn id="1" dur="indefinite" restart="never" nodeType="tmRoot"/>
+      </p:par>
+    </p:tnLst>
+  </p:timing>
+</p:sld>
+</file>
+
+<file path=ppt/slides/slide69.xml><?xml version="1.0" encoding="utf-8"?>
+<p:sld xmlns:a="http://schemas.openxmlformats.org/drawingml/2006/main" xmlns:r="http://schemas.openxmlformats.org/officeDocument/2006/relationships" xmlns:p="http://schemas.openxmlformats.org/presentationml/2006/main">
+  <p:cSld>
+    <p:bg>
+      <p:bgPr>
+        <a:solidFill>
+          <a:schemeClr val="bg1"/>
+        </a:solidFill>
+        <a:effectLst/>
+      </p:bgPr>
+    </p:bg>
+    <p:spTree>
+      <p:nvGrpSpPr>
+        <p:cNvPr id="1" name=""/>
+        <p:cNvGrpSpPr/>
+        <p:nvPr/>
+      </p:nvGrpSpPr>
+      <p:grpSpPr>
+        <a:xfrm>
+          <a:off x="0" y="0"/>
+          <a:ext cx="0" cy="0"/>
+          <a:chOff x="0" y="0"/>
+          <a:chExt cx="0" cy="0"/>
+        </a:xfrm>
+      </p:grpSpPr>
+      <p:sp>
+        <p:nvSpPr>
+          <p:cNvPr id="4" name="Content Placeholder 3"/>
+          <p:cNvSpPr>
+            <a:spLocks noGrp="1"/>
+          </p:cNvSpPr>
+          <p:nvPr>
+            <p:ph idx="1"/>
+          </p:nvPr>
+        </p:nvSpPr>
+        <p:spPr/>
+        <p:txBody>
+          <a:bodyPr/>
+          <a:lstStyle/>
+          <a:p>
+            <a:r>
+              <a:rPr lang="en-US" dirty="0" smtClean="0"/>
+              <a:t>Compare the memory locations of two objects</a:t>
+            </a:r>
+          </a:p>
+          <a:p>
+            <a:pPr lvl="1"/>
+            <a:r>
+              <a:rPr lang="en-US" dirty="0" smtClean="0"/>
+              <a:t>is</a:t>
+            </a:r>
+          </a:p>
+          <a:p>
+            <a:pPr lvl="2"/>
+            <a:r>
+              <a:rPr lang="en-US" dirty="0" smtClean="0"/>
+              <a:t>True if variables on both sides of the operator point to the same object, otherwise False</a:t>
+            </a:r>
+          </a:p>
+          <a:p>
+            <a:pPr lvl="1"/>
+            <a:r>
+              <a:rPr lang="en-US" dirty="0" smtClean="0"/>
+              <a:t>is not</a:t>
+            </a:r>
+            <a:r>
+              <a:rPr lang="en-US" dirty="0" smtClean="0"/>
+              <a:t> </a:t>
+            </a:r>
+          </a:p>
+          <a:p>
+            <a:pPr lvl="2"/>
+            <a:r>
+              <a:rPr lang="en-US" dirty="0" smtClean="0"/>
+              <a:t>False if variables on both sides of the operator point to the same object, otherwise True</a:t>
+            </a:r>
+          </a:p>
+          <a:p>
+            <a:pPr lvl="1"/>
+            <a:endParaRPr lang="en-US" dirty="0"/>
+          </a:p>
+        </p:txBody>
+      </p:sp>
+      <p:sp>
+        <p:nvSpPr>
+          <p:cNvPr id="3" name="Title 2"/>
+          <p:cNvSpPr>
+            <a:spLocks noGrp="1"/>
+          </p:cNvSpPr>
+          <p:nvPr>
+            <p:ph type="title"/>
+          </p:nvPr>
+        </p:nvSpPr>
+        <p:spPr/>
+        <p:txBody>
+          <a:bodyPr/>
+          <a:lstStyle/>
+          <a:p>
+            <a:r>
+              <a:rPr lang="en-US" dirty="0" smtClean="0"/>
+              <a:t>Identity Operators</a:t>
+            </a:r>
+            <a:endParaRPr lang="en-US" dirty="0"/>
+          </a:p>
+        </p:txBody>
+      </p:sp>
+    </p:spTree>
+    <p:extLst>
+      <p:ext uri="{BB962C8B-B14F-4D97-AF65-F5344CB8AC3E}">
+        <p14:creationId xmlns:p14="http://schemas.microsoft.com/office/powerpoint/2010/main" val="4152278287"/>
       </p:ext>
     </p:extLst>
   </p:cSld>
@@ -23224,6 +23726,490 @@
     <p:extLst>
       <p:ext uri="{BB962C8B-B14F-4D97-AF65-F5344CB8AC3E}">
         <p14:creationId xmlns:p14="http://schemas.microsoft.com/office/powerpoint/2010/main" val="744400195"/>
+      </p:ext>
+    </p:extLst>
+  </p:cSld>
+  <p:clrMapOvr>
+    <a:masterClrMapping/>
+  </p:clrMapOvr>
+  <p:timing>
+    <p:tnLst>
+      <p:par>
+        <p:cTn id="1" dur="indefinite" restart="never" nodeType="tmRoot"/>
+      </p:par>
+    </p:tnLst>
+  </p:timing>
+</p:sld>
+</file>
+
+<file path=ppt/slides/slide70.xml><?xml version="1.0" encoding="utf-8"?>
+<p:sld xmlns:a="http://schemas.openxmlformats.org/drawingml/2006/main" xmlns:r="http://schemas.openxmlformats.org/officeDocument/2006/relationships" xmlns:p="http://schemas.openxmlformats.org/presentationml/2006/main">
+  <p:cSld>
+    <p:bg>
+      <p:bgPr>
+        <a:solidFill>
+          <a:schemeClr val="bg1"/>
+        </a:solidFill>
+        <a:effectLst/>
+      </p:bgPr>
+    </p:bg>
+    <p:spTree>
+      <p:nvGrpSpPr>
+        <p:cNvPr id="1" name=""/>
+        <p:cNvGrpSpPr/>
+        <p:nvPr/>
+      </p:nvGrpSpPr>
+      <p:grpSpPr>
+        <a:xfrm>
+          <a:off x="0" y="0"/>
+          <a:ext cx="0" cy="0"/>
+          <a:chOff x="0" y="0"/>
+          <a:chExt cx="0" cy="0"/>
+        </a:xfrm>
+      </p:grpSpPr>
+      <p:sp>
+        <p:nvSpPr>
+          <p:cNvPr id="4" name="Content Placeholder 3"/>
+          <p:cNvSpPr>
+            <a:spLocks noGrp="1"/>
+          </p:cNvSpPr>
+          <p:nvPr>
+            <p:ph idx="1"/>
+          </p:nvPr>
+        </p:nvSpPr>
+        <p:spPr/>
+        <p:txBody>
+          <a:bodyPr/>
+          <a:lstStyle/>
+          <a:p>
+            <a:endParaRPr lang="en-US" dirty="0"/>
+          </a:p>
+        </p:txBody>
+      </p:sp>
+      <p:sp>
+        <p:nvSpPr>
+          <p:cNvPr id="3" name="Title 2"/>
+          <p:cNvSpPr>
+            <a:spLocks noGrp="1"/>
+          </p:cNvSpPr>
+          <p:nvPr>
+            <p:ph type="title"/>
+          </p:nvPr>
+        </p:nvSpPr>
+        <p:spPr/>
+        <p:txBody>
+          <a:bodyPr/>
+          <a:lstStyle/>
+          <a:p>
+            <a:r>
+              <a:rPr lang="en-US" dirty="0" smtClean="0"/>
+              <a:t>Identity: Examples</a:t>
+            </a:r>
+            <a:endParaRPr lang="en-US" dirty="0"/>
+          </a:p>
+        </p:txBody>
+      </p:sp>
+    </p:spTree>
+    <p:extLst>
+      <p:ext uri="{BB962C8B-B14F-4D97-AF65-F5344CB8AC3E}">
+        <p14:creationId xmlns:p14="http://schemas.microsoft.com/office/powerpoint/2010/main" val="1530654124"/>
+      </p:ext>
+    </p:extLst>
+  </p:cSld>
+  <p:clrMapOvr>
+    <a:masterClrMapping/>
+  </p:clrMapOvr>
+  <p:timing>
+    <p:tnLst>
+      <p:par>
+        <p:cTn id="1" dur="indefinite" restart="never" nodeType="tmRoot"/>
+      </p:par>
+    </p:tnLst>
+  </p:timing>
+</p:sld>
+</file>
+
+<file path=ppt/slides/slide71.xml><?xml version="1.0" encoding="utf-8"?>
+<p:sld xmlns:a="http://schemas.openxmlformats.org/drawingml/2006/main" xmlns:r="http://schemas.openxmlformats.org/officeDocument/2006/relationships" xmlns:p="http://schemas.openxmlformats.org/presentationml/2006/main">
+  <p:cSld>
+    <p:bg>
+      <p:bgPr>
+        <a:solidFill>
+          <a:schemeClr val="bg1"/>
+        </a:solidFill>
+        <a:effectLst/>
+      </p:bgPr>
+    </p:bg>
+    <p:spTree>
+      <p:nvGrpSpPr>
+        <p:cNvPr id="1" name=""/>
+        <p:cNvGrpSpPr/>
+        <p:nvPr/>
+      </p:nvGrpSpPr>
+      <p:grpSpPr>
+        <a:xfrm>
+          <a:off x="0" y="0"/>
+          <a:ext cx="0" cy="0"/>
+          <a:chOff x="0" y="0"/>
+          <a:chExt cx="0" cy="0"/>
+        </a:xfrm>
+      </p:grpSpPr>
+      <p:sp>
+        <p:nvSpPr>
+          <p:cNvPr id="4" name="Content Placeholder 3"/>
+          <p:cNvSpPr>
+            <a:spLocks noGrp="1"/>
+          </p:cNvSpPr>
+          <p:nvPr>
+            <p:ph idx="1"/>
+          </p:nvPr>
+        </p:nvSpPr>
+        <p:spPr/>
+        <p:txBody>
+          <a:bodyPr>
+            <a:normAutofit/>
+          </a:bodyPr>
+          <a:lstStyle/>
+          <a:p>
+            <a:r>
+              <a:rPr lang="en-US" dirty="0" smtClean="0"/>
+              <a:t>What is a module?</a:t>
+            </a:r>
+          </a:p>
+          <a:p>
+            <a:pPr lvl="1"/>
+            <a:r>
+              <a:rPr lang="en-US" dirty="0" smtClean="0"/>
+              <a:t>A file containing Python definitions and statements</a:t>
+            </a:r>
+          </a:p>
+          <a:p>
+            <a:pPr lvl="1"/>
+            <a:r>
+              <a:rPr lang="en-US" dirty="0" smtClean="0"/>
+              <a:t>Module files have the .</a:t>
+            </a:r>
+            <a:r>
+              <a:rPr lang="en-US" dirty="0" err="1" smtClean="0"/>
+              <a:t>py</a:t>
+            </a:r>
+            <a:r>
+              <a:rPr lang="en-US" dirty="0" smtClean="0"/>
+              <a:t> extension, e.g. mymodule.py</a:t>
+            </a:r>
+            <a:endParaRPr lang="en-US" dirty="0" smtClean="0"/>
+          </a:p>
+          <a:p>
+            <a:r>
+              <a:rPr lang="en-US" dirty="0" smtClean="0"/>
+              <a:t>Why do we use them?</a:t>
+            </a:r>
+          </a:p>
+          <a:p>
+            <a:pPr lvl="1"/>
+            <a:r>
+              <a:rPr lang="en-US" dirty="0" smtClean="0"/>
+              <a:t>Provide reusable code</a:t>
+            </a:r>
+          </a:p>
+          <a:p>
+            <a:pPr lvl="1"/>
+            <a:r>
+              <a:rPr lang="en-US" dirty="0" smtClean="0"/>
+              <a:t>Prevent code duplication</a:t>
+            </a:r>
+          </a:p>
+          <a:p>
+            <a:pPr lvl="1"/>
+            <a:r>
+              <a:rPr lang="en-US" dirty="0" smtClean="0"/>
+              <a:t>Split application code into functional groups</a:t>
+            </a:r>
+          </a:p>
+        </p:txBody>
+      </p:sp>
+      <p:sp>
+        <p:nvSpPr>
+          <p:cNvPr id="3" name="Title 2"/>
+          <p:cNvSpPr>
+            <a:spLocks noGrp="1"/>
+          </p:cNvSpPr>
+          <p:nvPr>
+            <p:ph type="title"/>
+          </p:nvPr>
+        </p:nvSpPr>
+        <p:spPr/>
+        <p:txBody>
+          <a:bodyPr/>
+          <a:lstStyle/>
+          <a:p>
+            <a:r>
+              <a:rPr lang="en-US" dirty="0" smtClean="0"/>
+              <a:t>Libraries, </a:t>
+            </a:r>
+            <a:r>
+              <a:rPr lang="en-US" dirty="0" err="1" smtClean="0"/>
+              <a:t>a.k.a</a:t>
+            </a:r>
+            <a:r>
+              <a:rPr lang="en-US" dirty="0" smtClean="0"/>
+              <a:t> Modules</a:t>
+            </a:r>
+            <a:endParaRPr lang="en-US" dirty="0"/>
+          </a:p>
+        </p:txBody>
+      </p:sp>
+    </p:spTree>
+    <p:extLst>
+      <p:ext uri="{BB962C8B-B14F-4D97-AF65-F5344CB8AC3E}">
+        <p14:creationId xmlns:p14="http://schemas.microsoft.com/office/powerpoint/2010/main" val="1762627127"/>
+      </p:ext>
+    </p:extLst>
+  </p:cSld>
+  <p:clrMapOvr>
+    <a:masterClrMapping/>
+  </p:clrMapOvr>
+  <p:timing>
+    <p:tnLst>
+      <p:par>
+        <p:cTn id="1" dur="indefinite" restart="never" nodeType="tmRoot"/>
+      </p:par>
+    </p:tnLst>
+  </p:timing>
+</p:sld>
+</file>
+
+<file path=ppt/slides/slide72.xml><?xml version="1.0" encoding="utf-8"?>
+<p:sld xmlns:a="http://schemas.openxmlformats.org/drawingml/2006/main" xmlns:r="http://schemas.openxmlformats.org/officeDocument/2006/relationships" xmlns:p="http://schemas.openxmlformats.org/presentationml/2006/main">
+  <p:cSld>
+    <p:bg>
+      <p:bgPr>
+        <a:solidFill>
+          <a:schemeClr val="bg1"/>
+        </a:solidFill>
+        <a:effectLst/>
+      </p:bgPr>
+    </p:bg>
+    <p:spTree>
+      <p:nvGrpSpPr>
+        <p:cNvPr id="1" name=""/>
+        <p:cNvGrpSpPr/>
+        <p:nvPr/>
+      </p:nvGrpSpPr>
+      <p:grpSpPr>
+        <a:xfrm>
+          <a:off x="0" y="0"/>
+          <a:ext cx="0" cy="0"/>
+          <a:chOff x="0" y="0"/>
+          <a:chExt cx="0" cy="0"/>
+        </a:xfrm>
+      </p:grpSpPr>
+      <p:sp>
+        <p:nvSpPr>
+          <p:cNvPr id="4" name="Content Placeholder 3"/>
+          <p:cNvSpPr>
+            <a:spLocks noGrp="1"/>
+          </p:cNvSpPr>
+          <p:nvPr>
+            <p:ph idx="1"/>
+          </p:nvPr>
+        </p:nvSpPr>
+        <p:spPr>
+          <a:xfrm>
+            <a:off x="1007436" y="1556792"/>
+            <a:ext cx="10574965" cy="4569373"/>
+          </a:xfrm>
+        </p:spPr>
+        <p:txBody>
+          <a:bodyPr>
+            <a:normAutofit lnSpcReduction="10000"/>
+          </a:bodyPr>
+          <a:lstStyle/>
+          <a:p>
+            <a:r>
+              <a:rPr lang="en-US" dirty="0" smtClean="0"/>
+              <a:t>Where to get them</a:t>
+            </a:r>
+          </a:p>
+          <a:p>
+            <a:pPr lvl="1"/>
+            <a:r>
+              <a:rPr lang="en-US" dirty="0" err="1" smtClean="0"/>
+              <a:t>Github</a:t>
+            </a:r>
+            <a:endParaRPr lang="en-US" dirty="0" smtClean="0"/>
+          </a:p>
+          <a:p>
+            <a:pPr lvl="1"/>
+            <a:r>
+              <a:rPr lang="en-US" dirty="0" smtClean="0"/>
+              <a:t>Pip</a:t>
+            </a:r>
+          </a:p>
+          <a:p>
+            <a:pPr lvl="1"/>
+            <a:r>
+              <a:rPr lang="en-US" dirty="0" err="1" smtClean="0"/>
+              <a:t>Bitbucket</a:t>
+            </a:r>
+            <a:endParaRPr lang="en-US" dirty="0" smtClean="0"/>
+          </a:p>
+          <a:p>
+            <a:pPr lvl="1"/>
+            <a:r>
+              <a:rPr lang="en-US" dirty="0" err="1" smtClean="0"/>
+              <a:t>PyPi</a:t>
+            </a:r>
+            <a:endParaRPr lang="en-US" dirty="0" smtClean="0"/>
+          </a:p>
+          <a:p>
+            <a:r>
+              <a:rPr lang="en-US" dirty="0" smtClean="0"/>
+              <a:t>Concerns</a:t>
+            </a:r>
+          </a:p>
+          <a:p>
+            <a:pPr lvl="1"/>
+            <a:r>
+              <a:rPr lang="en-US" dirty="0" smtClean="0"/>
+              <a:t>Black boxing</a:t>
+            </a:r>
+          </a:p>
+          <a:p>
+            <a:pPr lvl="1"/>
+            <a:r>
+              <a:rPr lang="en-US" dirty="0" smtClean="0"/>
+              <a:t>Security</a:t>
+            </a:r>
+            <a:endParaRPr lang="en-US" dirty="0"/>
+          </a:p>
+          <a:p>
+            <a:pPr lvl="1"/>
+            <a:r>
+              <a:rPr lang="en-US" dirty="0" smtClean="0"/>
+              <a:t>Support</a:t>
+            </a:r>
+          </a:p>
+        </p:txBody>
+      </p:sp>
+      <p:sp>
+        <p:nvSpPr>
+          <p:cNvPr id="3" name="Title 2"/>
+          <p:cNvSpPr>
+            <a:spLocks noGrp="1"/>
+          </p:cNvSpPr>
+          <p:nvPr>
+            <p:ph type="title"/>
+          </p:nvPr>
+        </p:nvSpPr>
+        <p:spPr/>
+        <p:txBody>
+          <a:bodyPr/>
+          <a:lstStyle/>
+          <a:p>
+            <a:r>
+              <a:rPr lang="en-US" dirty="0" smtClean="0"/>
+              <a:t>Libraries, </a:t>
+            </a:r>
+            <a:r>
+              <a:rPr lang="en-US" dirty="0" err="1" smtClean="0"/>
+              <a:t>a.k.a</a:t>
+            </a:r>
+            <a:r>
+              <a:rPr lang="en-US" dirty="0" smtClean="0"/>
+              <a:t> Modules</a:t>
+            </a:r>
+            <a:endParaRPr lang="en-US" dirty="0"/>
+          </a:p>
+        </p:txBody>
+      </p:sp>
+    </p:spTree>
+    <p:extLst>
+      <p:ext uri="{BB962C8B-B14F-4D97-AF65-F5344CB8AC3E}">
+        <p14:creationId xmlns:p14="http://schemas.microsoft.com/office/powerpoint/2010/main" val="4016755990"/>
+      </p:ext>
+    </p:extLst>
+  </p:cSld>
+  <p:clrMapOvr>
+    <a:masterClrMapping/>
+  </p:clrMapOvr>
+  <p:timing>
+    <p:tnLst>
+      <p:par>
+        <p:cTn id="1" dur="indefinite" restart="never" nodeType="tmRoot"/>
+      </p:par>
+    </p:tnLst>
+  </p:timing>
+</p:sld>
+</file>
+
+<file path=ppt/slides/slide73.xml><?xml version="1.0" encoding="utf-8"?>
+<p:sld xmlns:a="http://schemas.openxmlformats.org/drawingml/2006/main" xmlns:r="http://schemas.openxmlformats.org/officeDocument/2006/relationships" xmlns:p="http://schemas.openxmlformats.org/presentationml/2006/main">
+  <p:cSld>
+    <p:bg>
+      <p:bgPr>
+        <a:solidFill>
+          <a:schemeClr val="bg1"/>
+        </a:solidFill>
+        <a:effectLst/>
+      </p:bgPr>
+    </p:bg>
+    <p:spTree>
+      <p:nvGrpSpPr>
+        <p:cNvPr id="1" name=""/>
+        <p:cNvGrpSpPr/>
+        <p:nvPr/>
+      </p:nvGrpSpPr>
+      <p:grpSpPr>
+        <a:xfrm>
+          <a:off x="0" y="0"/>
+          <a:ext cx="0" cy="0"/>
+          <a:chOff x="0" y="0"/>
+          <a:chExt cx="0" cy="0"/>
+        </a:xfrm>
+      </p:grpSpPr>
+      <p:sp>
+        <p:nvSpPr>
+          <p:cNvPr id="4" name="Content Placeholder 3"/>
+          <p:cNvSpPr>
+            <a:spLocks noGrp="1"/>
+          </p:cNvSpPr>
+          <p:nvPr>
+            <p:ph idx="1"/>
+          </p:nvPr>
+        </p:nvSpPr>
+        <p:spPr/>
+        <p:txBody>
+          <a:bodyPr/>
+          <a:lstStyle/>
+          <a:p>
+            <a:endParaRPr lang="en-US" dirty="0"/>
+          </a:p>
+        </p:txBody>
+      </p:sp>
+      <p:sp>
+        <p:nvSpPr>
+          <p:cNvPr id="3" name="Title 2"/>
+          <p:cNvSpPr>
+            <a:spLocks noGrp="1"/>
+          </p:cNvSpPr>
+          <p:nvPr>
+            <p:ph type="title"/>
+          </p:nvPr>
+        </p:nvSpPr>
+        <p:spPr/>
+        <p:txBody>
+          <a:bodyPr/>
+          <a:lstStyle/>
+          <a:p>
+            <a:endParaRPr lang="en-US"/>
+          </a:p>
+        </p:txBody>
+      </p:sp>
+    </p:spTree>
+    <p:extLst>
+      <p:ext uri="{BB962C8B-B14F-4D97-AF65-F5344CB8AC3E}">
+        <p14:creationId xmlns:p14="http://schemas.microsoft.com/office/powerpoint/2010/main" val="1427963118"/>
       </p:ext>
     </p:extLst>
   </p:cSld>

</xml_diff>

<commit_message>
File IO Paths and File Operations slides
</commit_message>
<xml_diff>
--- a/Programming Foundations.pptx
+++ b/Programming Foundations.pptx
@@ -5,7 +5,7 @@
     <p:sldMasterId id="2147483648" r:id="rId1"/>
   </p:sldMasterIdLst>
   <p:notesMasterIdLst>
-    <p:notesMasterId r:id="rId84"/>
+    <p:notesMasterId r:id="rId95"/>
   </p:notesMasterIdLst>
   <p:sldIdLst>
     <p:sldId id="256" r:id="rId2"/>
@@ -87,9 +87,20 @@
     <p:sldId id="328" r:id="rId78"/>
     <p:sldId id="333" r:id="rId79"/>
     <p:sldId id="335" r:id="rId80"/>
-    <p:sldId id="337" r:id="rId81"/>
-    <p:sldId id="336" r:id="rId82"/>
-    <p:sldId id="338" r:id="rId83"/>
+    <p:sldId id="339" r:id="rId81"/>
+    <p:sldId id="337" r:id="rId82"/>
+    <p:sldId id="336" r:id="rId83"/>
+    <p:sldId id="338" r:id="rId84"/>
+    <p:sldId id="341" r:id="rId85"/>
+    <p:sldId id="342" r:id="rId86"/>
+    <p:sldId id="344" r:id="rId87"/>
+    <p:sldId id="347" r:id="rId88"/>
+    <p:sldId id="345" r:id="rId89"/>
+    <p:sldId id="346" r:id="rId90"/>
+    <p:sldId id="343" r:id="rId91"/>
+    <p:sldId id="350" r:id="rId92"/>
+    <p:sldId id="348" r:id="rId93"/>
+    <p:sldId id="349" r:id="rId94"/>
   </p:sldIdLst>
   <p:sldSz cx="12192000" cy="6858000"/>
   <p:notesSz cx="6858000" cy="9144000"/>
@@ -284,9 +295,20 @@
             <p14:sldId id="328"/>
             <p14:sldId id="333"/>
             <p14:sldId id="335"/>
+            <p14:sldId id="339"/>
             <p14:sldId id="337"/>
             <p14:sldId id="336"/>
             <p14:sldId id="338"/>
+            <p14:sldId id="341"/>
+            <p14:sldId id="342"/>
+            <p14:sldId id="344"/>
+            <p14:sldId id="347"/>
+            <p14:sldId id="345"/>
+            <p14:sldId id="346"/>
+            <p14:sldId id="343"/>
+            <p14:sldId id="350"/>
+            <p14:sldId id="348"/>
+            <p14:sldId id="349"/>
           </p14:sldIdLst>
         </p14:section>
       </p14:sectionLst>
@@ -1655,7 +1677,7 @@
                 </a:solidFill>
               </a:rPr>
               <a:pPr/>
-              <a:t>80</a:t>
+              <a:t>81</a:t>
             </a:fld>
             <a:endParaRPr lang="en-GB" dirty="0">
               <a:solidFill>
@@ -1669,6 +1691,141 @@
     <p:extLst>
       <p:ext uri="{BB962C8B-B14F-4D97-AF65-F5344CB8AC3E}">
         <p14:creationId xmlns:p14="http://schemas.microsoft.com/office/powerpoint/2010/main" val="118522055"/>
+      </p:ext>
+    </p:extLst>
+  </p:cSld>
+  <p:clrMapOvr>
+    <a:masterClrMapping/>
+  </p:clrMapOvr>
+</p:notes>
+</file>
+
+<file path=ppt/notesSlides/notesSlide17.xml><?xml version="1.0" encoding="utf-8"?>
+<p:notes xmlns:a="http://schemas.openxmlformats.org/drawingml/2006/main" xmlns:r="http://schemas.openxmlformats.org/officeDocument/2006/relationships" xmlns:p="http://schemas.openxmlformats.org/presentationml/2006/main">
+  <p:cSld>
+    <p:spTree>
+      <p:nvGrpSpPr>
+        <p:cNvPr id="1" name=""/>
+        <p:cNvGrpSpPr/>
+        <p:nvPr/>
+      </p:nvGrpSpPr>
+      <p:grpSpPr>
+        <a:xfrm>
+          <a:off x="0" y="0"/>
+          <a:ext cx="0" cy="0"/>
+          <a:chOff x="0" y="0"/>
+          <a:chExt cx="0" cy="0"/>
+        </a:xfrm>
+      </p:grpSpPr>
+      <p:sp>
+        <p:nvSpPr>
+          <p:cNvPr id="2" name="Slide Image Placeholder 1"/>
+          <p:cNvSpPr>
+            <a:spLocks noGrp="1" noRot="1" noChangeAspect="1"/>
+          </p:cNvSpPr>
+          <p:nvPr>
+            <p:ph type="sldImg"/>
+          </p:nvPr>
+        </p:nvSpPr>
+        <p:spPr/>
+      </p:sp>
+      <p:sp>
+        <p:nvSpPr>
+          <p:cNvPr id="3" name="Notes Placeholder 2"/>
+          <p:cNvSpPr>
+            <a:spLocks noGrp="1"/>
+          </p:cNvSpPr>
+          <p:nvPr>
+            <p:ph type="body" idx="1"/>
+          </p:nvPr>
+        </p:nvSpPr>
+        <p:spPr/>
+        <p:txBody>
+          <a:bodyPr/>
+          <a:lstStyle/>
+          <a:p>
+            <a:r>
+              <a:rPr lang="en-US" b="1" dirty="0" smtClean="0"/>
+              <a:t>Exercise</a:t>
+            </a:r>
+            <a:r>
+              <a:rPr lang="en-US" b="1" baseline="0" dirty="0" smtClean="0"/>
+              <a:t> – Mathematical Operations</a:t>
+            </a:r>
+          </a:p>
+          <a:p>
+            <a:endParaRPr lang="en-GB" b="1" baseline="0" dirty="0" smtClean="0"/>
+          </a:p>
+          <a:p>
+            <a:r>
+              <a:rPr lang="en-GB" b="0" baseline="0" dirty="0" smtClean="0">
+                <a:solidFill>
+                  <a:srgbClr val="FF0000"/>
+                </a:solidFill>
+              </a:rPr>
+              <a:t>Design an exercise where the delegates build upon the user of the input and </a:t>
+            </a:r>
+            <a:r>
+              <a:rPr lang="en-GB" b="0" baseline="0" dirty="0" err="1" smtClean="0">
+                <a:solidFill>
+                  <a:srgbClr val="FF0000"/>
+                </a:solidFill>
+              </a:rPr>
+              <a:t>raw_input</a:t>
+            </a:r>
+            <a:r>
+              <a:rPr lang="en-GB" b="0" baseline="0" dirty="0" smtClean="0">
+                <a:solidFill>
+                  <a:srgbClr val="FF0000"/>
+                </a:solidFill>
+              </a:rPr>
+              <a:t> functions to take input and build a calculator or something.</a:t>
+            </a:r>
+          </a:p>
+          <a:p>
+            <a:endParaRPr lang="en-US" dirty="0" smtClean="0"/>
+          </a:p>
+          <a:p>
+            <a:endParaRPr lang="en-US" dirty="0"/>
+          </a:p>
+        </p:txBody>
+      </p:sp>
+      <p:sp>
+        <p:nvSpPr>
+          <p:cNvPr id="4" name="Slide Number Placeholder 3"/>
+          <p:cNvSpPr>
+            <a:spLocks noGrp="1"/>
+          </p:cNvSpPr>
+          <p:nvPr>
+            <p:ph type="sldNum" sz="quarter" idx="10"/>
+          </p:nvPr>
+        </p:nvSpPr>
+        <p:spPr/>
+        <p:txBody>
+          <a:bodyPr/>
+          <a:lstStyle/>
+          <a:p>
+            <a:fld id="{D2FD33D1-5F8B-45B7-9940-CBFFF9C06F51}" type="slidenum">
+              <a:rPr lang="en-GB" smtClean="0">
+                <a:solidFill>
+                  <a:prstClr val="black"/>
+                </a:solidFill>
+              </a:rPr>
+              <a:pPr/>
+              <a:t>91</a:t>
+            </a:fld>
+            <a:endParaRPr lang="en-GB" dirty="0">
+              <a:solidFill>
+                <a:prstClr val="black"/>
+              </a:solidFill>
+            </a:endParaRPr>
+          </a:p>
+        </p:txBody>
+      </p:sp>
+    </p:spTree>
+    <p:extLst>
+      <p:ext uri="{BB962C8B-B14F-4D97-AF65-F5344CB8AC3E}">
+        <p14:creationId xmlns:p14="http://schemas.microsoft.com/office/powerpoint/2010/main" val="207883666"/>
       </p:ext>
     </p:extLst>
   </p:cSld>
@@ -25382,80 +25539,6 @@
 <file path=ppt/slides/slide80.xml><?xml version="1.0" encoding="utf-8"?>
 <p:sld xmlns:a="http://schemas.openxmlformats.org/drawingml/2006/main" xmlns:r="http://schemas.openxmlformats.org/officeDocument/2006/relationships" xmlns:p="http://schemas.openxmlformats.org/presentationml/2006/main">
   <p:cSld>
-    <p:spTree>
-      <p:nvGrpSpPr>
-        <p:cNvPr id="1" name=""/>
-        <p:cNvGrpSpPr/>
-        <p:nvPr/>
-      </p:nvGrpSpPr>
-      <p:grpSpPr>
-        <a:xfrm>
-          <a:off x="0" y="0"/>
-          <a:ext cx="0" cy="0"/>
-          <a:chOff x="0" y="0"/>
-          <a:chExt cx="0" cy="0"/>
-        </a:xfrm>
-      </p:grpSpPr>
-      <p:sp>
-        <p:nvSpPr>
-          <p:cNvPr id="4" name="Title 3"/>
-          <p:cNvSpPr>
-            <a:spLocks noGrp="1"/>
-          </p:cNvSpPr>
-          <p:nvPr>
-            <p:ph type="title"/>
-          </p:nvPr>
-        </p:nvSpPr>
-        <p:spPr/>
-        <p:txBody>
-          <a:bodyPr>
-            <a:normAutofit/>
-          </a:bodyPr>
-          <a:lstStyle/>
-          <a:p>
-            <a:r>
-              <a:rPr lang="en-US" dirty="0" smtClean="0">
-                <a:solidFill>
-                  <a:srgbClr val="C4A174"/>
-                </a:solidFill>
-              </a:rPr>
-              <a:t>Exercise:</a:t>
-            </a:r>
-            <a:r>
-              <a:rPr lang="en-US" dirty="0" smtClean="0"/>
-              <a:t> </a:t>
-            </a:r>
-            <a:r>
-              <a:rPr lang="en-US" dirty="0" smtClean="0"/>
-              <a:t>Debugging</a:t>
-            </a:r>
-            <a:endParaRPr lang="en-US" dirty="0"/>
-          </a:p>
-        </p:txBody>
-      </p:sp>
-    </p:spTree>
-    <p:extLst>
-      <p:ext uri="{BB962C8B-B14F-4D97-AF65-F5344CB8AC3E}">
-        <p14:creationId xmlns:p14="http://schemas.microsoft.com/office/powerpoint/2010/main" val="1260493395"/>
-      </p:ext>
-    </p:extLst>
-  </p:cSld>
-  <p:clrMapOvr>
-    <a:masterClrMapping/>
-  </p:clrMapOvr>
-  <p:timing>
-    <p:tnLst>
-      <p:par>
-        <p:cTn id="1" dur="indefinite" restart="never" nodeType="tmRoot"/>
-      </p:par>
-    </p:tnLst>
-  </p:timing>
-</p:sld>
-</file>
-
-<file path=ppt/slides/slide81.xml><?xml version="1.0" encoding="utf-8"?>
-<p:sld xmlns:a="http://schemas.openxmlformats.org/drawingml/2006/main" xmlns:r="http://schemas.openxmlformats.org/officeDocument/2006/relationships" xmlns:p="http://schemas.openxmlformats.org/presentationml/2006/main">
-  <p:cSld>
     <p:bg>
       <p:bgPr>
         <a:solidFill>
@@ -25512,14 +25595,96 @@
           <a:bodyPr/>
           <a:lstStyle/>
           <a:p>
-            <a:endParaRPr lang="en-US"/>
+            <a:r>
+              <a:rPr lang="en-US" dirty="0" smtClean="0"/>
+              <a:t>Debugging: </a:t>
+            </a:r>
+            <a:r>
+              <a:rPr lang="en-US" dirty="0" smtClean="0"/>
+              <a:t>Examples</a:t>
+            </a:r>
+            <a:endParaRPr lang="en-US" dirty="0"/>
           </a:p>
         </p:txBody>
       </p:sp>
     </p:spTree>
     <p:extLst>
       <p:ext uri="{BB962C8B-B14F-4D97-AF65-F5344CB8AC3E}">
-        <p14:creationId xmlns:p14="http://schemas.microsoft.com/office/powerpoint/2010/main" val="1081349820"/>
+        <p14:creationId xmlns:p14="http://schemas.microsoft.com/office/powerpoint/2010/main" val="1956684700"/>
+      </p:ext>
+    </p:extLst>
+  </p:cSld>
+  <p:clrMapOvr>
+    <a:masterClrMapping/>
+  </p:clrMapOvr>
+  <p:timing>
+    <p:tnLst>
+      <p:par>
+        <p:cTn id="1" dur="indefinite" restart="never" nodeType="tmRoot"/>
+      </p:par>
+    </p:tnLst>
+  </p:timing>
+</p:sld>
+</file>
+
+<file path=ppt/slides/slide81.xml><?xml version="1.0" encoding="utf-8"?>
+<p:sld xmlns:a="http://schemas.openxmlformats.org/drawingml/2006/main" xmlns:r="http://schemas.openxmlformats.org/officeDocument/2006/relationships" xmlns:p="http://schemas.openxmlformats.org/presentationml/2006/main">
+  <p:cSld>
+    <p:spTree>
+      <p:nvGrpSpPr>
+        <p:cNvPr id="1" name=""/>
+        <p:cNvGrpSpPr/>
+        <p:nvPr/>
+      </p:nvGrpSpPr>
+      <p:grpSpPr>
+        <a:xfrm>
+          <a:off x="0" y="0"/>
+          <a:ext cx="0" cy="0"/>
+          <a:chOff x="0" y="0"/>
+          <a:chExt cx="0" cy="0"/>
+        </a:xfrm>
+      </p:grpSpPr>
+      <p:sp>
+        <p:nvSpPr>
+          <p:cNvPr id="4" name="Title 3"/>
+          <p:cNvSpPr>
+            <a:spLocks noGrp="1"/>
+          </p:cNvSpPr>
+          <p:nvPr>
+            <p:ph type="title"/>
+          </p:nvPr>
+        </p:nvSpPr>
+        <p:spPr/>
+        <p:txBody>
+          <a:bodyPr>
+            <a:normAutofit/>
+          </a:bodyPr>
+          <a:lstStyle/>
+          <a:p>
+            <a:r>
+              <a:rPr lang="en-US" dirty="0" smtClean="0">
+                <a:solidFill>
+                  <a:srgbClr val="C4A174"/>
+                </a:solidFill>
+              </a:rPr>
+              <a:t>Exercise:</a:t>
+            </a:r>
+            <a:r>
+              <a:rPr lang="en-US" dirty="0" smtClean="0"/>
+              <a:t> </a:t>
+            </a:r>
+            <a:r>
+              <a:rPr lang="en-US" dirty="0" smtClean="0"/>
+              <a:t>Debugging</a:t>
+            </a:r>
+            <a:endParaRPr lang="en-US" dirty="0"/>
+          </a:p>
+        </p:txBody>
+      </p:sp>
+    </p:spTree>
+    <p:extLst>
+      <p:ext uri="{BB962C8B-B14F-4D97-AF65-F5344CB8AC3E}">
+        <p14:creationId xmlns:p14="http://schemas.microsoft.com/office/powerpoint/2010/main" val="1260493395"/>
       </p:ext>
     </p:extLst>
   </p:cSld>
@@ -25576,6 +25741,36 @@
           <a:bodyPr/>
           <a:lstStyle/>
           <a:p>
+            <a:r>
+              <a:rPr lang="en-US" dirty="0" smtClean="0"/>
+              <a:t>What are file types?</a:t>
+            </a:r>
+          </a:p>
+          <a:p>
+            <a:pPr lvl="1"/>
+            <a:r>
+              <a:rPr lang="en-US" dirty="0" smtClean="0"/>
+              <a:t>Data can be expressed in numerous ways – JSON, XML, CSV, TXT, BIN, DOC, XLS, PPT</a:t>
+            </a:r>
+          </a:p>
+          <a:p>
+            <a:pPr lvl="1"/>
+            <a:r>
+              <a:rPr lang="en-US" dirty="0" smtClean="0"/>
+              <a:t>File extension indicates data structure</a:t>
+            </a:r>
+          </a:p>
+          <a:p>
+            <a:pPr lvl="1"/>
+            <a:r>
+              <a:rPr lang="en-US" dirty="0" smtClean="0"/>
+              <a:t>Allows efficient and convenient data exchange</a:t>
+            </a:r>
+          </a:p>
+          <a:p>
+            <a:pPr marL="457200" lvl="1" indent="0">
+              <a:buNone/>
+            </a:pPr>
             <a:endParaRPr lang="en-US" dirty="0"/>
           </a:p>
         </p:txBody>
@@ -25595,7 +25790,275 @@
           <a:bodyPr/>
           <a:lstStyle/>
           <a:p>
-            <a:endParaRPr lang="en-US"/>
+            <a:r>
+              <a:rPr lang="en-US" dirty="0" smtClean="0"/>
+              <a:t>File types</a:t>
+            </a:r>
+            <a:endParaRPr lang="en-US" dirty="0"/>
+          </a:p>
+        </p:txBody>
+      </p:sp>
+    </p:spTree>
+    <p:extLst>
+      <p:ext uri="{BB962C8B-B14F-4D97-AF65-F5344CB8AC3E}">
+        <p14:creationId xmlns:p14="http://schemas.microsoft.com/office/powerpoint/2010/main" val="1081349820"/>
+      </p:ext>
+    </p:extLst>
+  </p:cSld>
+  <p:clrMapOvr>
+    <a:masterClrMapping/>
+  </p:clrMapOvr>
+  <p:timing>
+    <p:tnLst>
+      <p:par>
+        <p:cTn id="1" dur="indefinite" restart="never" nodeType="tmRoot"/>
+      </p:par>
+    </p:tnLst>
+  </p:timing>
+</p:sld>
+</file>
+
+<file path=ppt/slides/slide83.xml><?xml version="1.0" encoding="utf-8"?>
+<p:sld xmlns:a="http://schemas.openxmlformats.org/drawingml/2006/main" xmlns:r="http://schemas.openxmlformats.org/officeDocument/2006/relationships" xmlns:p="http://schemas.openxmlformats.org/presentationml/2006/main">
+  <p:cSld>
+    <p:bg>
+      <p:bgPr>
+        <a:solidFill>
+          <a:schemeClr val="bg1"/>
+        </a:solidFill>
+        <a:effectLst/>
+      </p:bgPr>
+    </p:bg>
+    <p:spTree>
+      <p:nvGrpSpPr>
+        <p:cNvPr id="1" name=""/>
+        <p:cNvGrpSpPr/>
+        <p:nvPr/>
+      </p:nvGrpSpPr>
+      <p:grpSpPr>
+        <a:xfrm>
+          <a:off x="0" y="0"/>
+          <a:ext cx="0" cy="0"/>
+          <a:chOff x="0" y="0"/>
+          <a:chExt cx="0" cy="0"/>
+        </a:xfrm>
+      </p:grpSpPr>
+      <p:sp>
+        <p:nvSpPr>
+          <p:cNvPr id="4" name="Content Placeholder 3"/>
+          <p:cNvSpPr>
+            <a:spLocks noGrp="1"/>
+          </p:cNvSpPr>
+          <p:nvPr>
+            <p:ph idx="1"/>
+          </p:nvPr>
+        </p:nvSpPr>
+        <p:spPr/>
+        <p:txBody>
+          <a:bodyPr/>
+          <a:lstStyle/>
+          <a:p>
+            <a:r>
+              <a:rPr lang="en-US" dirty="0" smtClean="0"/>
+              <a:t>What does ‘IO’ mean?</a:t>
+            </a:r>
+          </a:p>
+          <a:p>
+            <a:r>
+              <a:rPr lang="en-US" dirty="0" smtClean="0"/>
+              <a:t>How do we interact with files?</a:t>
+            </a:r>
+          </a:p>
+          <a:p>
+            <a:pPr lvl="1"/>
+            <a:r>
+              <a:rPr lang="en-US" dirty="0" smtClean="0"/>
+              <a:t>What’s the ‘path’ to the fil</a:t>
+            </a:r>
+            <a:r>
+              <a:rPr lang="en-US" dirty="0" smtClean="0"/>
+              <a:t>e?</a:t>
+            </a:r>
+          </a:p>
+          <a:p>
+            <a:pPr lvl="2"/>
+            <a:r>
+              <a:rPr lang="en-US" dirty="0" smtClean="0"/>
+              <a:t>The route from the root of the drive to the file</a:t>
+            </a:r>
+          </a:p>
+          <a:p>
+            <a:pPr lvl="2"/>
+            <a:r>
+              <a:rPr lang="en-US" dirty="0" smtClean="0"/>
+              <a:t>Operating systems express paths differently</a:t>
+            </a:r>
+          </a:p>
+          <a:p>
+            <a:pPr lvl="3"/>
+            <a:r>
+              <a:rPr lang="en-US" dirty="0"/>
+              <a:t>C:\</a:t>
+            </a:r>
+            <a:r>
+              <a:rPr lang="en-US" dirty="0" smtClean="0"/>
+              <a:t>Windows\System32</a:t>
+            </a:r>
+          </a:p>
+          <a:p>
+            <a:pPr lvl="3"/>
+            <a:r>
+              <a:rPr lang="en-US" dirty="0" smtClean="0"/>
+              <a:t>/</a:t>
+            </a:r>
+            <a:r>
+              <a:rPr lang="en-US" dirty="0" err="1" smtClean="0"/>
+              <a:t>usr</a:t>
+            </a:r>
+            <a:r>
+              <a:rPr lang="en-US" dirty="0" smtClean="0"/>
+              <a:t>/bin</a:t>
+            </a:r>
+          </a:p>
+          <a:p>
+            <a:pPr lvl="3"/>
+            <a:endParaRPr lang="en-US" dirty="0" smtClean="0"/>
+          </a:p>
+          <a:p>
+            <a:pPr lvl="3"/>
+            <a:endParaRPr lang="en-US" dirty="0"/>
+          </a:p>
+        </p:txBody>
+      </p:sp>
+      <p:sp>
+        <p:nvSpPr>
+          <p:cNvPr id="3" name="Title 2"/>
+          <p:cNvSpPr>
+            <a:spLocks noGrp="1"/>
+          </p:cNvSpPr>
+          <p:nvPr>
+            <p:ph type="title"/>
+          </p:nvPr>
+        </p:nvSpPr>
+        <p:spPr/>
+        <p:txBody>
+          <a:bodyPr/>
+          <a:lstStyle/>
+          <a:p>
+            <a:r>
+              <a:rPr lang="en-US" dirty="0" smtClean="0"/>
+              <a:t>File IO</a:t>
+            </a:r>
+            <a:endParaRPr lang="en-US" dirty="0"/>
+          </a:p>
+        </p:txBody>
+      </p:sp>
+      <p:sp>
+        <p:nvSpPr>
+          <p:cNvPr id="5" name="Rectangle 2"/>
+          <p:cNvSpPr>
+            <a:spLocks noChangeArrowheads="1"/>
+          </p:cNvSpPr>
+          <p:nvPr/>
+        </p:nvSpPr>
+        <p:spPr bwMode="auto">
+          <a:xfrm>
+            <a:off x="0" y="0"/>
+            <a:ext cx="12192000" cy="457200"/>
+          </a:xfrm>
+          <a:prstGeom prst="rect">
+            <a:avLst/>
+          </a:prstGeom>
+          <a:solidFill>
+            <a:srgbClr val="FFFFFF"/>
+          </a:solidFill>
+          <a:ln>
+            <a:noFill/>
+          </a:ln>
+          <a:effectLst/>
+          <a:extLst>
+            <a:ext uri="{91240B29-F687-4F45-9708-019B960494DF}">
+              <a14:hiddenLine xmlns:a14="http://schemas.microsoft.com/office/drawing/2010/main" w="9525">
+                <a:solidFill>
+                  <a:schemeClr val="tx1"/>
+                </a:solidFill>
+                <a:miter lim="800000"/>
+                <a:headEnd/>
+                <a:tailEnd/>
+              </a14:hiddenLine>
+            </a:ext>
+            <a:ext uri="{AF507438-7753-43E0-B8FC-AC1667EBCBE1}">
+              <a14:hiddenEffects xmlns:a14="http://schemas.microsoft.com/office/drawing/2010/main">
+                <a:effectLst>
+                  <a:outerShdw dist="35921" dir="2700000" algn="ctr" rotWithShape="0">
+                    <a:schemeClr val="bg2"/>
+                  </a:outerShdw>
+                </a:effectLst>
+              </a14:hiddenEffects>
+            </a:ext>
+          </a:extLst>
+        </p:spPr>
+        <p:txBody>
+          <a:bodyPr vert="horz" wrap="none" lIns="91440" tIns="45720" rIns="91440" bIns="45720" numCol="1" anchor="ctr" anchorCtr="0" compatLnSpc="1">
+            <a:prstTxWarp prst="textNoShape">
+              <a:avLst/>
+            </a:prstTxWarp>
+            <a:spAutoFit/>
+          </a:bodyPr>
+          <a:lstStyle/>
+          <a:p>
+            <a:pPr marL="0" marR="0" lvl="0" indent="0" algn="l" defTabSz="914400" rtl="0" eaLnBrk="0" fontAlgn="base" latinLnBrk="0" hangingPunct="0">
+              <a:lnSpc>
+                <a:spcPct val="100000"/>
+              </a:lnSpc>
+              <a:spcBef>
+                <a:spcPct val="0"/>
+              </a:spcBef>
+              <a:spcAft>
+                <a:spcPct val="0"/>
+              </a:spcAft>
+              <a:buClrTx/>
+              <a:buSzTx/>
+              <a:buFontTx/>
+              <a:buNone/>
+              <a:tabLst/>
+            </a:pPr>
+            <a:r>
+              <a:rPr kumimoji="0" lang="en-US" sz="1000" b="1" i="0" u="none" strike="noStrike" cap="none" normalizeH="0" baseline="0" smtClean="0">
+                <a:ln>
+                  <a:noFill/>
+                </a:ln>
+                <a:solidFill>
+                  <a:srgbClr val="000000"/>
+                </a:solidFill>
+                <a:effectLst/>
+                <a:latin typeface="Arial Unicode MS" panose="020B0604020202020204" pitchFamily="34" charset="-128"/>
+                <a:cs typeface="Times New Roman" panose="02020603050405020304" pitchFamily="18" charset="0"/>
+              </a:rPr>
+              <a:t>/dev/hda</a:t>
+            </a:r>
+            <a:r>
+              <a:rPr kumimoji="0" lang="en-US" sz="800" b="0" i="0" u="none" strike="noStrike" cap="none" normalizeH="0" baseline="0" smtClean="0">
+                <a:ln>
+                  <a:noFill/>
+                </a:ln>
+                <a:solidFill>
+                  <a:schemeClr val="tx1"/>
+                </a:solidFill>
+                <a:effectLst/>
+              </a:rPr>
+              <a:t> </a:t>
+            </a:r>
+            <a:endParaRPr kumimoji="0" lang="en-US" sz="1800" b="0" i="0" u="none" strike="noStrike" cap="none" normalizeH="0" baseline="0" smtClean="0">
+              <a:ln>
+                <a:noFill/>
+              </a:ln>
+              <a:solidFill>
+                <a:schemeClr val="tx1"/>
+              </a:solidFill>
+              <a:effectLst/>
+              <a:latin typeface="Arial" panose="020B0604020202020204" pitchFamily="34" charset="0"/>
+            </a:endParaRPr>
           </a:p>
         </p:txBody>
       </p:sp>
@@ -25603,6 +26066,962 @@
     <p:extLst>
       <p:ext uri="{BB962C8B-B14F-4D97-AF65-F5344CB8AC3E}">
         <p14:creationId xmlns:p14="http://schemas.microsoft.com/office/powerpoint/2010/main" val="2677945179"/>
+      </p:ext>
+    </p:extLst>
+  </p:cSld>
+  <p:clrMapOvr>
+    <a:masterClrMapping/>
+  </p:clrMapOvr>
+  <p:timing>
+    <p:tnLst>
+      <p:par>
+        <p:cTn id="1" dur="indefinite" restart="never" nodeType="tmRoot"/>
+      </p:par>
+    </p:tnLst>
+  </p:timing>
+</p:sld>
+</file>
+
+<file path=ppt/slides/slide84.xml><?xml version="1.0" encoding="utf-8"?>
+<p:sld xmlns:a="http://schemas.openxmlformats.org/drawingml/2006/main" xmlns:r="http://schemas.openxmlformats.org/officeDocument/2006/relationships" xmlns:p="http://schemas.openxmlformats.org/presentationml/2006/main">
+  <p:cSld>
+    <p:bg>
+      <p:bgPr>
+        <a:solidFill>
+          <a:schemeClr val="bg1"/>
+        </a:solidFill>
+        <a:effectLst/>
+      </p:bgPr>
+    </p:bg>
+    <p:spTree>
+      <p:nvGrpSpPr>
+        <p:cNvPr id="1" name=""/>
+        <p:cNvGrpSpPr/>
+        <p:nvPr/>
+      </p:nvGrpSpPr>
+      <p:grpSpPr>
+        <a:xfrm>
+          <a:off x="0" y="0"/>
+          <a:ext cx="0" cy="0"/>
+          <a:chOff x="0" y="0"/>
+          <a:chExt cx="0" cy="0"/>
+        </a:xfrm>
+      </p:grpSpPr>
+      <p:sp>
+        <p:nvSpPr>
+          <p:cNvPr id="4" name="Content Placeholder 3"/>
+          <p:cNvSpPr>
+            <a:spLocks noGrp="1"/>
+          </p:cNvSpPr>
+          <p:nvPr>
+            <p:ph idx="1"/>
+          </p:nvPr>
+        </p:nvSpPr>
+        <p:spPr/>
+        <p:txBody>
+          <a:bodyPr>
+            <a:normAutofit lnSpcReduction="10000"/>
+          </a:bodyPr>
+          <a:lstStyle/>
+          <a:p>
+            <a:pPr marL="457200" lvl="2" indent="-457200"/>
+            <a:r>
+              <a:rPr lang="en-US" dirty="0"/>
+              <a:t>How do we account for the differences in path syntax between operating systems?</a:t>
+            </a:r>
+          </a:p>
+          <a:p>
+            <a:pPr lvl="1"/>
+            <a:r>
+              <a:rPr lang="en-US" dirty="0" smtClean="0"/>
+              <a:t>In Python, use the </a:t>
+            </a:r>
+            <a:r>
+              <a:rPr lang="en-US" dirty="0" err="1" smtClean="0"/>
+              <a:t>os.path</a:t>
+            </a:r>
+            <a:r>
+              <a:rPr lang="en-US" dirty="0" smtClean="0"/>
+              <a:t> module</a:t>
+            </a:r>
+          </a:p>
+          <a:p>
+            <a:pPr lvl="1"/>
+            <a:r>
+              <a:rPr lang="en-US" dirty="0" smtClean="0"/>
+              <a:t>Python always loads the path module suitable for the operating system it is running on</a:t>
+            </a:r>
+          </a:p>
+          <a:p>
+            <a:pPr lvl="1"/>
+            <a:r>
+              <a:rPr lang="en-US" dirty="0" smtClean="0"/>
+              <a:t>Specific modules can be loaded to manipulate paths that ar</a:t>
+            </a:r>
+            <a:r>
+              <a:rPr lang="en-US" dirty="0" smtClean="0"/>
+              <a:t>e always in one of the different formats, such as</a:t>
+            </a:r>
+          </a:p>
+          <a:p>
+            <a:pPr lvl="2"/>
+            <a:r>
+              <a:rPr lang="en-US" dirty="0" err="1" smtClean="0"/>
+              <a:t>posixpath</a:t>
+            </a:r>
+            <a:r>
+              <a:rPr lang="en-US" dirty="0" smtClean="0"/>
+              <a:t> for Unix-style paths</a:t>
+            </a:r>
+          </a:p>
+          <a:p>
+            <a:pPr lvl="2"/>
+            <a:r>
+              <a:rPr lang="en-US" dirty="0" err="1"/>
+              <a:t>n</a:t>
+            </a:r>
+            <a:r>
+              <a:rPr lang="en-US" dirty="0" err="1" smtClean="0"/>
+              <a:t>tpath</a:t>
+            </a:r>
+            <a:r>
+              <a:rPr lang="en-US" dirty="0" smtClean="0"/>
+              <a:t> for Windows-style paths</a:t>
+            </a:r>
+          </a:p>
+          <a:p>
+            <a:pPr lvl="2"/>
+            <a:r>
+              <a:rPr lang="en-US" dirty="0" err="1" smtClean="0"/>
+              <a:t>macpath</a:t>
+            </a:r>
+            <a:r>
+              <a:rPr lang="en-US" dirty="0" smtClean="0"/>
+              <a:t> for old-style </a:t>
+            </a:r>
+            <a:r>
+              <a:rPr lang="en-US" dirty="0" err="1" smtClean="0"/>
+              <a:t>MacOS</a:t>
+            </a:r>
+            <a:r>
+              <a:rPr lang="en-US" dirty="0" smtClean="0"/>
+              <a:t> paths</a:t>
+            </a:r>
+            <a:endParaRPr lang="en-US" dirty="0"/>
+          </a:p>
+        </p:txBody>
+      </p:sp>
+      <p:sp>
+        <p:nvSpPr>
+          <p:cNvPr id="3" name="Title 2"/>
+          <p:cNvSpPr>
+            <a:spLocks noGrp="1"/>
+          </p:cNvSpPr>
+          <p:nvPr>
+            <p:ph type="title"/>
+          </p:nvPr>
+        </p:nvSpPr>
+        <p:spPr/>
+        <p:txBody>
+          <a:bodyPr/>
+          <a:lstStyle/>
+          <a:p>
+            <a:r>
+              <a:rPr lang="en-US" dirty="0" smtClean="0"/>
+              <a:t>File IO</a:t>
+            </a:r>
+            <a:endParaRPr lang="en-US" dirty="0"/>
+          </a:p>
+        </p:txBody>
+      </p:sp>
+    </p:spTree>
+    <p:extLst>
+      <p:ext uri="{BB962C8B-B14F-4D97-AF65-F5344CB8AC3E}">
+        <p14:creationId xmlns:p14="http://schemas.microsoft.com/office/powerpoint/2010/main" val="1106993298"/>
+      </p:ext>
+    </p:extLst>
+  </p:cSld>
+  <p:clrMapOvr>
+    <a:masterClrMapping/>
+  </p:clrMapOvr>
+  <p:timing>
+    <p:tnLst>
+      <p:par>
+        <p:cTn id="1" dur="indefinite" restart="never" nodeType="tmRoot"/>
+      </p:par>
+    </p:tnLst>
+  </p:timing>
+</p:sld>
+</file>
+
+<file path=ppt/slides/slide85.xml><?xml version="1.0" encoding="utf-8"?>
+<p:sld xmlns:a="http://schemas.openxmlformats.org/drawingml/2006/main" xmlns:r="http://schemas.openxmlformats.org/officeDocument/2006/relationships" xmlns:p="http://schemas.openxmlformats.org/presentationml/2006/main">
+  <p:cSld>
+    <p:bg>
+      <p:bgPr>
+        <a:solidFill>
+          <a:schemeClr val="bg1"/>
+        </a:solidFill>
+        <a:effectLst/>
+      </p:bgPr>
+    </p:bg>
+    <p:spTree>
+      <p:nvGrpSpPr>
+        <p:cNvPr id="1" name=""/>
+        <p:cNvGrpSpPr/>
+        <p:nvPr/>
+      </p:nvGrpSpPr>
+      <p:grpSpPr>
+        <a:xfrm>
+          <a:off x="0" y="0"/>
+          <a:ext cx="0" cy="0"/>
+          <a:chOff x="0" y="0"/>
+          <a:chExt cx="0" cy="0"/>
+        </a:xfrm>
+      </p:grpSpPr>
+      <p:sp>
+        <p:nvSpPr>
+          <p:cNvPr id="4" name="Content Placeholder 3"/>
+          <p:cNvSpPr>
+            <a:spLocks noGrp="1"/>
+          </p:cNvSpPr>
+          <p:nvPr>
+            <p:ph idx="1"/>
+          </p:nvPr>
+        </p:nvSpPr>
+        <p:spPr/>
+        <p:txBody>
+          <a:bodyPr/>
+          <a:lstStyle/>
+          <a:p>
+            <a:endParaRPr lang="en-US" dirty="0"/>
+          </a:p>
+        </p:txBody>
+      </p:sp>
+      <p:sp>
+        <p:nvSpPr>
+          <p:cNvPr id="3" name="Title 2"/>
+          <p:cNvSpPr>
+            <a:spLocks noGrp="1"/>
+          </p:cNvSpPr>
+          <p:nvPr>
+            <p:ph type="title"/>
+          </p:nvPr>
+        </p:nvSpPr>
+        <p:spPr/>
+        <p:txBody>
+          <a:bodyPr/>
+          <a:lstStyle/>
+          <a:p>
+            <a:r>
+              <a:rPr lang="en-US" dirty="0" smtClean="0"/>
+              <a:t>File IO: Path Examples</a:t>
+            </a:r>
+            <a:endParaRPr lang="en-US" dirty="0"/>
+          </a:p>
+        </p:txBody>
+      </p:sp>
+    </p:spTree>
+    <p:extLst>
+      <p:ext uri="{BB962C8B-B14F-4D97-AF65-F5344CB8AC3E}">
+        <p14:creationId xmlns:p14="http://schemas.microsoft.com/office/powerpoint/2010/main" val="3224124106"/>
+      </p:ext>
+    </p:extLst>
+  </p:cSld>
+  <p:clrMapOvr>
+    <a:masterClrMapping/>
+  </p:clrMapOvr>
+  <p:timing>
+    <p:tnLst>
+      <p:par>
+        <p:cTn id="1" dur="indefinite" restart="never" nodeType="tmRoot"/>
+      </p:par>
+    </p:tnLst>
+  </p:timing>
+</p:sld>
+</file>
+
+<file path=ppt/slides/slide86.xml><?xml version="1.0" encoding="utf-8"?>
+<p:sld xmlns:a="http://schemas.openxmlformats.org/drawingml/2006/main" xmlns:r="http://schemas.openxmlformats.org/officeDocument/2006/relationships" xmlns:p="http://schemas.openxmlformats.org/presentationml/2006/main">
+  <p:cSld>
+    <p:bg>
+      <p:bgPr>
+        <a:solidFill>
+          <a:schemeClr val="bg1"/>
+        </a:solidFill>
+        <a:effectLst/>
+      </p:bgPr>
+    </p:bg>
+    <p:spTree>
+      <p:nvGrpSpPr>
+        <p:cNvPr id="1" name=""/>
+        <p:cNvGrpSpPr/>
+        <p:nvPr/>
+      </p:nvGrpSpPr>
+      <p:grpSpPr>
+        <a:xfrm>
+          <a:off x="0" y="0"/>
+          <a:ext cx="0" cy="0"/>
+          <a:chOff x="0" y="0"/>
+          <a:chExt cx="0" cy="0"/>
+        </a:xfrm>
+      </p:grpSpPr>
+      <p:sp>
+        <p:nvSpPr>
+          <p:cNvPr id="4" name="Content Placeholder 3"/>
+          <p:cNvSpPr>
+            <a:spLocks noGrp="1"/>
+          </p:cNvSpPr>
+          <p:nvPr>
+            <p:ph idx="1"/>
+          </p:nvPr>
+        </p:nvSpPr>
+        <p:spPr/>
+        <p:txBody>
+          <a:bodyPr>
+            <a:normAutofit fontScale="92500" lnSpcReduction="10000"/>
+          </a:bodyPr>
+          <a:lstStyle/>
+          <a:p>
+            <a:r>
+              <a:rPr lang="en-US" dirty="0" smtClean="0"/>
+              <a:t>How do we open a file?</a:t>
+            </a:r>
+          </a:p>
+          <a:p>
+            <a:pPr lvl="1"/>
+            <a:r>
+              <a:rPr lang="en-US" dirty="0" smtClean="0"/>
+              <a:t>open(</a:t>
+            </a:r>
+            <a:r>
+              <a:rPr lang="en-US" i="1" dirty="0" smtClean="0"/>
+              <a:t>name[,mode[,buffering]]</a:t>
+            </a:r>
+            <a:r>
+              <a:rPr lang="en-US" dirty="0" smtClean="0"/>
+              <a:t>)</a:t>
+            </a:r>
+          </a:p>
+          <a:p>
+            <a:pPr lvl="2"/>
+            <a:r>
+              <a:rPr lang="en-US" dirty="0" smtClean="0"/>
+              <a:t>name </a:t>
+            </a:r>
+            <a:r>
+              <a:rPr lang="en-US" dirty="0" smtClean="0"/>
+              <a:t>– file name to be opened</a:t>
+            </a:r>
+          </a:p>
+          <a:p>
+            <a:pPr lvl="2"/>
+            <a:r>
+              <a:rPr lang="en-US" dirty="0" smtClean="0"/>
+              <a:t>mode – string indicating how the file is to be opened</a:t>
+            </a:r>
+          </a:p>
+          <a:p>
+            <a:pPr lvl="3"/>
+            <a:r>
+              <a:rPr lang="en-US" dirty="0" smtClean="0"/>
+              <a:t>r – for reading</a:t>
+            </a:r>
+          </a:p>
+          <a:p>
+            <a:pPr lvl="3"/>
+            <a:r>
+              <a:rPr lang="en-US" dirty="0" smtClean="0"/>
+              <a:t>w – for writing</a:t>
+            </a:r>
+          </a:p>
+          <a:p>
+            <a:pPr lvl="3"/>
+            <a:r>
+              <a:rPr lang="en-US" dirty="0" smtClean="0"/>
+              <a:t>a – for appending</a:t>
+            </a:r>
+          </a:p>
+          <a:p>
+            <a:pPr lvl="3"/>
+            <a:r>
+              <a:rPr lang="en-US" dirty="0" smtClean="0"/>
+              <a:t>defaults to ‘r’</a:t>
+            </a:r>
+            <a:endParaRPr lang="en-US" dirty="0" smtClean="0"/>
+          </a:p>
+          <a:p>
+            <a:pPr lvl="2"/>
+            <a:r>
+              <a:rPr lang="en-US" dirty="0" smtClean="0"/>
+              <a:t>buffering – optional argument indicating desired buffer size</a:t>
+            </a:r>
+          </a:p>
+          <a:p>
+            <a:pPr lvl="3"/>
+            <a:r>
+              <a:rPr lang="en-US" dirty="0" smtClean="0"/>
+              <a:t>0 – </a:t>
+            </a:r>
+            <a:r>
+              <a:rPr lang="en-US" dirty="0" err="1" smtClean="0"/>
+              <a:t>unbuffered</a:t>
+            </a:r>
+            <a:endParaRPr lang="en-US" dirty="0" smtClean="0"/>
+          </a:p>
+          <a:p>
+            <a:pPr lvl="3"/>
+            <a:r>
+              <a:rPr lang="en-US" dirty="0" smtClean="0"/>
+              <a:t>1 – line buffered</a:t>
+            </a:r>
+          </a:p>
+          <a:p>
+            <a:pPr lvl="3"/>
+            <a:r>
+              <a:rPr lang="en-US" dirty="0" smtClean="0"/>
+              <a:t>any other positive value in bytes</a:t>
+            </a:r>
+          </a:p>
+          <a:p>
+            <a:pPr marL="914400" lvl="2" indent="0">
+              <a:buNone/>
+            </a:pPr>
+            <a:endParaRPr lang="en-US" dirty="0"/>
+          </a:p>
+        </p:txBody>
+      </p:sp>
+      <p:sp>
+        <p:nvSpPr>
+          <p:cNvPr id="3" name="Title 2"/>
+          <p:cNvSpPr>
+            <a:spLocks noGrp="1"/>
+          </p:cNvSpPr>
+          <p:nvPr>
+            <p:ph type="title"/>
+          </p:nvPr>
+        </p:nvSpPr>
+        <p:spPr/>
+        <p:txBody>
+          <a:bodyPr/>
+          <a:lstStyle/>
+          <a:p>
+            <a:r>
+              <a:rPr lang="en-US" dirty="0" smtClean="0"/>
+              <a:t>File IO: File Operations</a:t>
+            </a:r>
+            <a:endParaRPr lang="en-US" dirty="0"/>
+          </a:p>
+        </p:txBody>
+      </p:sp>
+    </p:spTree>
+    <p:extLst>
+      <p:ext uri="{BB962C8B-B14F-4D97-AF65-F5344CB8AC3E}">
+        <p14:creationId xmlns:p14="http://schemas.microsoft.com/office/powerpoint/2010/main" val="2870467808"/>
+      </p:ext>
+    </p:extLst>
+  </p:cSld>
+  <p:clrMapOvr>
+    <a:masterClrMapping/>
+  </p:clrMapOvr>
+  <p:timing>
+    <p:tnLst>
+      <p:par>
+        <p:cTn id="1" dur="indefinite" restart="never" nodeType="tmRoot"/>
+      </p:par>
+    </p:tnLst>
+  </p:timing>
+</p:sld>
+</file>
+
+<file path=ppt/slides/slide87.xml><?xml version="1.0" encoding="utf-8"?>
+<p:sld xmlns:a="http://schemas.openxmlformats.org/drawingml/2006/main" xmlns:r="http://schemas.openxmlformats.org/officeDocument/2006/relationships" xmlns:p="http://schemas.openxmlformats.org/presentationml/2006/main">
+  <p:cSld>
+    <p:bg>
+      <p:bgPr>
+        <a:solidFill>
+          <a:schemeClr val="bg1"/>
+        </a:solidFill>
+        <a:effectLst/>
+      </p:bgPr>
+    </p:bg>
+    <p:spTree>
+      <p:nvGrpSpPr>
+        <p:cNvPr id="1" name=""/>
+        <p:cNvGrpSpPr/>
+        <p:nvPr/>
+      </p:nvGrpSpPr>
+      <p:grpSpPr>
+        <a:xfrm>
+          <a:off x="0" y="0"/>
+          <a:ext cx="0" cy="0"/>
+          <a:chOff x="0" y="0"/>
+          <a:chExt cx="0" cy="0"/>
+        </a:xfrm>
+      </p:grpSpPr>
+      <p:sp>
+        <p:nvSpPr>
+          <p:cNvPr id="4" name="Content Placeholder 3"/>
+          <p:cNvSpPr>
+            <a:spLocks noGrp="1"/>
+          </p:cNvSpPr>
+          <p:nvPr>
+            <p:ph idx="1"/>
+          </p:nvPr>
+        </p:nvSpPr>
+        <p:spPr/>
+        <p:txBody>
+          <a:bodyPr>
+            <a:normAutofit/>
+          </a:bodyPr>
+          <a:lstStyle/>
+          <a:p>
+            <a:r>
+              <a:rPr lang="en-US" dirty="0" smtClean="0"/>
+              <a:t>But I want to read </a:t>
+            </a:r>
+            <a:r>
+              <a:rPr lang="en-US" i="1" dirty="0" smtClean="0"/>
+              <a:t>and</a:t>
+            </a:r>
+            <a:r>
+              <a:rPr lang="en-US" dirty="0" smtClean="0"/>
+              <a:t> write!</a:t>
+            </a:r>
+          </a:p>
+          <a:p>
+            <a:pPr lvl="1"/>
+            <a:r>
+              <a:rPr lang="en-US" dirty="0" smtClean="0"/>
+              <a:t>append a ‘+’ to the mode to open the file for updating (reading and writing)</a:t>
+            </a:r>
+          </a:p>
+          <a:p>
+            <a:pPr lvl="2"/>
+            <a:r>
+              <a:rPr lang="en-US" dirty="0" smtClean="0"/>
+              <a:t>r+, w</a:t>
+            </a:r>
+            <a:r>
+              <a:rPr lang="en-US" dirty="0" smtClean="0"/>
+              <a:t>+, </a:t>
+            </a:r>
+            <a:r>
+              <a:rPr lang="en-US" dirty="0" smtClean="0"/>
+              <a:t>a+</a:t>
+            </a:r>
+            <a:endParaRPr lang="en-US" dirty="0"/>
+          </a:p>
+          <a:p>
+            <a:pPr lvl="1"/>
+            <a:r>
+              <a:rPr lang="en-US" dirty="0" smtClean="0"/>
+              <a:t>note that ‘w+’ truncates the file</a:t>
+            </a:r>
+          </a:p>
+          <a:p>
+            <a:pPr lvl="1"/>
+            <a:endParaRPr lang="en-US" dirty="0" smtClean="0"/>
+          </a:p>
+        </p:txBody>
+      </p:sp>
+      <p:sp>
+        <p:nvSpPr>
+          <p:cNvPr id="3" name="Title 2"/>
+          <p:cNvSpPr>
+            <a:spLocks noGrp="1"/>
+          </p:cNvSpPr>
+          <p:nvPr>
+            <p:ph type="title"/>
+          </p:nvPr>
+        </p:nvSpPr>
+        <p:spPr/>
+        <p:txBody>
+          <a:bodyPr/>
+          <a:lstStyle/>
+          <a:p>
+            <a:r>
+              <a:rPr lang="en-US" dirty="0" smtClean="0"/>
+              <a:t>File IO: File Operations</a:t>
+            </a:r>
+            <a:endParaRPr lang="en-US" dirty="0"/>
+          </a:p>
+        </p:txBody>
+      </p:sp>
+    </p:spTree>
+    <p:extLst>
+      <p:ext uri="{BB962C8B-B14F-4D97-AF65-F5344CB8AC3E}">
+        <p14:creationId xmlns:p14="http://schemas.microsoft.com/office/powerpoint/2010/main" val="2622588657"/>
+      </p:ext>
+    </p:extLst>
+  </p:cSld>
+  <p:clrMapOvr>
+    <a:masterClrMapping/>
+  </p:clrMapOvr>
+  <p:timing>
+    <p:tnLst>
+      <p:par>
+        <p:cTn id="1" dur="indefinite" restart="never" nodeType="tmRoot"/>
+      </p:par>
+    </p:tnLst>
+  </p:timing>
+</p:sld>
+</file>
+
+<file path=ppt/slides/slide88.xml><?xml version="1.0" encoding="utf-8"?>
+<p:sld xmlns:a="http://schemas.openxmlformats.org/drawingml/2006/main" xmlns:r="http://schemas.openxmlformats.org/officeDocument/2006/relationships" xmlns:p="http://schemas.openxmlformats.org/presentationml/2006/main">
+  <p:cSld>
+    <p:bg>
+      <p:bgPr>
+        <a:solidFill>
+          <a:schemeClr val="bg1"/>
+        </a:solidFill>
+        <a:effectLst/>
+      </p:bgPr>
+    </p:bg>
+    <p:spTree>
+      <p:nvGrpSpPr>
+        <p:cNvPr id="1" name=""/>
+        <p:cNvGrpSpPr/>
+        <p:nvPr/>
+      </p:nvGrpSpPr>
+      <p:grpSpPr>
+        <a:xfrm>
+          <a:off x="0" y="0"/>
+          <a:ext cx="0" cy="0"/>
+          <a:chOff x="0" y="0"/>
+          <a:chExt cx="0" cy="0"/>
+        </a:xfrm>
+      </p:grpSpPr>
+      <p:sp>
+        <p:nvSpPr>
+          <p:cNvPr id="4" name="Content Placeholder 3"/>
+          <p:cNvSpPr>
+            <a:spLocks noGrp="1"/>
+          </p:cNvSpPr>
+          <p:nvPr>
+            <p:ph idx="1"/>
+          </p:nvPr>
+        </p:nvSpPr>
+        <p:spPr/>
+        <p:txBody>
+          <a:bodyPr/>
+          <a:lstStyle/>
+          <a:p>
+            <a:r>
+              <a:rPr lang="en-US" dirty="0" smtClean="0"/>
+              <a:t>But what about binary data?</a:t>
+            </a:r>
+          </a:p>
+          <a:p>
+            <a:pPr lvl="1"/>
+            <a:r>
+              <a:rPr lang="en-US" dirty="0" smtClean="0"/>
+              <a:t>open() defaults to tex</a:t>
+            </a:r>
+            <a:r>
+              <a:rPr lang="en-US" dirty="0" smtClean="0"/>
+              <a:t>t mode</a:t>
+            </a:r>
+          </a:p>
+          <a:p>
+            <a:pPr lvl="1"/>
+            <a:r>
+              <a:rPr lang="en-US" dirty="0" smtClean="0"/>
+              <a:t>append ‘b’ to the mode for binary on systems that differentiate between text and binary data</a:t>
+            </a:r>
+            <a:endParaRPr lang="en-US" dirty="0"/>
+          </a:p>
+          <a:p>
+            <a:pPr lvl="2"/>
+            <a:r>
+              <a:rPr lang="en-US" dirty="0" err="1" smtClean="0"/>
+              <a:t>rb</a:t>
+            </a:r>
+            <a:r>
+              <a:rPr lang="en-US" dirty="0" smtClean="0"/>
+              <a:t>, </a:t>
+            </a:r>
+            <a:r>
+              <a:rPr lang="en-US" dirty="0" err="1" smtClean="0"/>
+              <a:t>wb</a:t>
+            </a:r>
+            <a:r>
+              <a:rPr lang="en-US" dirty="0" smtClean="0"/>
+              <a:t>, </a:t>
+            </a:r>
+            <a:r>
+              <a:rPr lang="en-US" dirty="0" err="1" smtClean="0"/>
+              <a:t>ab</a:t>
+            </a:r>
+            <a:endParaRPr lang="en-US" dirty="0" smtClean="0"/>
+          </a:p>
+          <a:p>
+            <a:pPr lvl="1"/>
+            <a:r>
+              <a:rPr lang="en-US" dirty="0" smtClean="0"/>
+              <a:t>Has no effect on systems that don’t differentiate</a:t>
+            </a:r>
+          </a:p>
+          <a:p>
+            <a:pPr lvl="1"/>
+            <a:endParaRPr lang="en-US" dirty="0" smtClean="0"/>
+          </a:p>
+          <a:p>
+            <a:pPr marL="914400" lvl="2" indent="0">
+              <a:buNone/>
+            </a:pPr>
+            <a:endParaRPr lang="en-US" dirty="0" smtClean="0"/>
+          </a:p>
+        </p:txBody>
+      </p:sp>
+      <p:sp>
+        <p:nvSpPr>
+          <p:cNvPr id="3" name="Title 2"/>
+          <p:cNvSpPr>
+            <a:spLocks noGrp="1"/>
+          </p:cNvSpPr>
+          <p:nvPr>
+            <p:ph type="title"/>
+          </p:nvPr>
+        </p:nvSpPr>
+        <p:spPr/>
+        <p:txBody>
+          <a:bodyPr/>
+          <a:lstStyle/>
+          <a:p>
+            <a:r>
+              <a:rPr lang="en-US" dirty="0" smtClean="0"/>
+              <a:t>File IO: File Operations</a:t>
+            </a:r>
+            <a:endParaRPr lang="en-US" dirty="0"/>
+          </a:p>
+        </p:txBody>
+      </p:sp>
+    </p:spTree>
+    <p:extLst>
+      <p:ext uri="{BB962C8B-B14F-4D97-AF65-F5344CB8AC3E}">
+        <p14:creationId xmlns:p14="http://schemas.microsoft.com/office/powerpoint/2010/main" val="1760797253"/>
+      </p:ext>
+    </p:extLst>
+  </p:cSld>
+  <p:clrMapOvr>
+    <a:masterClrMapping/>
+  </p:clrMapOvr>
+  <p:timing>
+    <p:tnLst>
+      <p:par>
+        <p:cTn id="1" dur="indefinite" restart="never" nodeType="tmRoot"/>
+      </p:par>
+    </p:tnLst>
+  </p:timing>
+</p:sld>
+</file>
+
+<file path=ppt/slides/slide89.xml><?xml version="1.0" encoding="utf-8"?>
+<p:sld xmlns:a="http://schemas.openxmlformats.org/drawingml/2006/main" xmlns:r="http://schemas.openxmlformats.org/officeDocument/2006/relationships" xmlns:p="http://schemas.openxmlformats.org/presentationml/2006/main">
+  <p:cSld>
+    <p:bg>
+      <p:bgPr>
+        <a:solidFill>
+          <a:schemeClr val="bg1"/>
+        </a:solidFill>
+        <a:effectLst/>
+      </p:bgPr>
+    </p:bg>
+    <p:spTree>
+      <p:nvGrpSpPr>
+        <p:cNvPr id="1" name=""/>
+        <p:cNvGrpSpPr/>
+        <p:nvPr/>
+      </p:nvGrpSpPr>
+      <p:grpSpPr>
+        <a:xfrm>
+          <a:off x="0" y="0"/>
+          <a:ext cx="0" cy="0"/>
+          <a:chOff x="0" y="0"/>
+          <a:chExt cx="0" cy="0"/>
+        </a:xfrm>
+      </p:grpSpPr>
+      <p:sp>
+        <p:nvSpPr>
+          <p:cNvPr id="4" name="Content Placeholder 3"/>
+          <p:cNvSpPr>
+            <a:spLocks noGrp="1"/>
+          </p:cNvSpPr>
+          <p:nvPr>
+            <p:ph idx="1"/>
+          </p:nvPr>
+        </p:nvSpPr>
+        <p:spPr/>
+        <p:txBody>
+          <a:bodyPr>
+            <a:normAutofit lnSpcReduction="10000"/>
+          </a:bodyPr>
+          <a:lstStyle/>
+          <a:p>
+            <a:r>
+              <a:rPr lang="en-US" dirty="0" smtClean="0"/>
+              <a:t>Can I delete files?</a:t>
+            </a:r>
+          </a:p>
+          <a:p>
+            <a:pPr lvl="1"/>
+            <a:r>
+              <a:rPr lang="en-US" dirty="0" err="1" smtClean="0"/>
+              <a:t>os.remove</a:t>
+            </a:r>
+            <a:r>
+              <a:rPr lang="en-US" dirty="0" smtClean="0"/>
+              <a:t>(</a:t>
+            </a:r>
+            <a:r>
+              <a:rPr lang="en-US" i="1" dirty="0" smtClean="0"/>
+              <a:t>path</a:t>
+            </a:r>
+            <a:r>
+              <a:rPr lang="en-US" dirty="0" smtClean="0"/>
+              <a:t>)</a:t>
+            </a:r>
+          </a:p>
+          <a:p>
+            <a:r>
+              <a:rPr lang="en-US" dirty="0" smtClean="0"/>
+              <a:t>What about directories?</a:t>
+            </a:r>
+          </a:p>
+          <a:p>
+            <a:pPr lvl="1"/>
+            <a:r>
+              <a:rPr lang="en-US" dirty="0" err="1" smtClean="0"/>
+              <a:t>os.rmdir</a:t>
+            </a:r>
+            <a:r>
+              <a:rPr lang="en-US" dirty="0" smtClean="0"/>
+              <a:t>(</a:t>
+            </a:r>
+            <a:r>
+              <a:rPr lang="en-US" i="1" dirty="0" smtClean="0"/>
+              <a:t>path</a:t>
+            </a:r>
+            <a:r>
+              <a:rPr lang="en-US" dirty="0" smtClean="0"/>
+              <a:t>)</a:t>
+            </a:r>
+            <a:endParaRPr lang="en-US" dirty="0"/>
+          </a:p>
+          <a:p>
+            <a:pPr lvl="1"/>
+            <a:r>
+              <a:rPr lang="en-US" dirty="0" err="1" smtClean="0"/>
+              <a:t>os.removedirs</a:t>
+            </a:r>
+            <a:r>
+              <a:rPr lang="en-US" dirty="0" smtClean="0"/>
+              <a:t>(</a:t>
+            </a:r>
+            <a:r>
+              <a:rPr lang="en-US" i="1" dirty="0" smtClean="0"/>
+              <a:t>path</a:t>
+            </a:r>
+            <a:r>
+              <a:rPr lang="en-US" dirty="0" smtClean="0"/>
+              <a:t>)</a:t>
+            </a:r>
+            <a:endParaRPr lang="en-US" dirty="0"/>
+          </a:p>
+          <a:p>
+            <a:r>
+              <a:rPr lang="en-US" dirty="0" smtClean="0"/>
+              <a:t>Can I do anything else?</a:t>
+            </a:r>
+          </a:p>
+          <a:p>
+            <a:pPr lvl="1"/>
+            <a:r>
+              <a:rPr lang="en-US" dirty="0" err="1" smtClean="0"/>
+              <a:t>os.listdir</a:t>
+            </a:r>
+            <a:r>
+              <a:rPr lang="en-US" dirty="0" smtClean="0"/>
+              <a:t>(</a:t>
+            </a:r>
+            <a:r>
+              <a:rPr lang="en-US" i="1" dirty="0"/>
+              <a:t>path</a:t>
+            </a:r>
+            <a:r>
+              <a:rPr lang="en-US" dirty="0" smtClean="0"/>
+              <a:t>)</a:t>
+            </a:r>
+          </a:p>
+          <a:p>
+            <a:pPr lvl="1"/>
+            <a:r>
+              <a:rPr lang="en-US" dirty="0" err="1" smtClean="0"/>
+              <a:t>os.rename</a:t>
+            </a:r>
+            <a:r>
+              <a:rPr lang="en-US" dirty="0" smtClean="0"/>
+              <a:t>(</a:t>
+            </a:r>
+            <a:r>
+              <a:rPr lang="en-US" i="1" dirty="0" err="1" smtClean="0"/>
+              <a:t>src,dest</a:t>
+            </a:r>
+            <a:r>
+              <a:rPr lang="en-US" dirty="0" smtClean="0"/>
+              <a:t>)</a:t>
+            </a:r>
+          </a:p>
+          <a:p>
+            <a:pPr lvl="1"/>
+            <a:r>
+              <a:rPr lang="en-US" dirty="0" err="1" smtClean="0"/>
+              <a:t>os.mkdir</a:t>
+            </a:r>
+            <a:r>
+              <a:rPr lang="en-US" dirty="0" smtClean="0"/>
+              <a:t>(</a:t>
+            </a:r>
+            <a:r>
+              <a:rPr lang="en-US" i="1" dirty="0" smtClean="0"/>
+              <a:t>path[,mode]</a:t>
+            </a:r>
+            <a:r>
+              <a:rPr lang="en-US" dirty="0" smtClean="0"/>
+              <a:t>)</a:t>
+            </a:r>
+          </a:p>
+        </p:txBody>
+      </p:sp>
+      <p:sp>
+        <p:nvSpPr>
+          <p:cNvPr id="3" name="Title 2"/>
+          <p:cNvSpPr>
+            <a:spLocks noGrp="1"/>
+          </p:cNvSpPr>
+          <p:nvPr>
+            <p:ph type="title"/>
+          </p:nvPr>
+        </p:nvSpPr>
+        <p:spPr/>
+        <p:txBody>
+          <a:bodyPr/>
+          <a:lstStyle/>
+          <a:p>
+            <a:r>
+              <a:rPr lang="en-US" dirty="0" smtClean="0"/>
+              <a:t>File IO</a:t>
+            </a:r>
+            <a:endParaRPr lang="en-US" dirty="0"/>
+          </a:p>
+        </p:txBody>
+      </p:sp>
+    </p:spTree>
+    <p:extLst>
+      <p:ext uri="{BB962C8B-B14F-4D97-AF65-F5344CB8AC3E}">
+        <p14:creationId xmlns:p14="http://schemas.microsoft.com/office/powerpoint/2010/main" val="3485451260"/>
       </p:ext>
     </p:extLst>
   </p:cSld>
@@ -25715,6 +27134,333 @@
     <p:extLst>
       <p:ext uri="{BB962C8B-B14F-4D97-AF65-F5344CB8AC3E}">
         <p14:creationId xmlns:p14="http://schemas.microsoft.com/office/powerpoint/2010/main" val="1132235158"/>
+      </p:ext>
+    </p:extLst>
+  </p:cSld>
+  <p:clrMapOvr>
+    <a:masterClrMapping/>
+  </p:clrMapOvr>
+  <p:timing>
+    <p:tnLst>
+      <p:par>
+        <p:cTn id="1" dur="indefinite" restart="never" nodeType="tmRoot"/>
+      </p:par>
+    </p:tnLst>
+  </p:timing>
+</p:sld>
+</file>
+
+<file path=ppt/slides/slide90.xml><?xml version="1.0" encoding="utf-8"?>
+<p:sld xmlns:a="http://schemas.openxmlformats.org/drawingml/2006/main" xmlns:r="http://schemas.openxmlformats.org/officeDocument/2006/relationships" xmlns:p="http://schemas.openxmlformats.org/presentationml/2006/main">
+  <p:cSld>
+    <p:bg>
+      <p:bgPr>
+        <a:solidFill>
+          <a:schemeClr val="bg1"/>
+        </a:solidFill>
+        <a:effectLst/>
+      </p:bgPr>
+    </p:bg>
+    <p:spTree>
+      <p:nvGrpSpPr>
+        <p:cNvPr id="1" name=""/>
+        <p:cNvGrpSpPr/>
+        <p:nvPr/>
+      </p:nvGrpSpPr>
+      <p:grpSpPr>
+        <a:xfrm>
+          <a:off x="0" y="0"/>
+          <a:ext cx="0" cy="0"/>
+          <a:chOff x="0" y="0"/>
+          <a:chExt cx="0" cy="0"/>
+        </a:xfrm>
+      </p:grpSpPr>
+      <p:sp>
+        <p:nvSpPr>
+          <p:cNvPr id="4" name="Content Placeholder 3"/>
+          <p:cNvSpPr>
+            <a:spLocks noGrp="1"/>
+          </p:cNvSpPr>
+          <p:nvPr>
+            <p:ph idx="1"/>
+          </p:nvPr>
+        </p:nvSpPr>
+        <p:spPr/>
+        <p:txBody>
+          <a:bodyPr/>
+          <a:lstStyle/>
+          <a:p>
+            <a:endParaRPr lang="en-US" dirty="0"/>
+          </a:p>
+        </p:txBody>
+      </p:sp>
+      <p:sp>
+        <p:nvSpPr>
+          <p:cNvPr id="3" name="Title 2"/>
+          <p:cNvSpPr>
+            <a:spLocks noGrp="1"/>
+          </p:cNvSpPr>
+          <p:nvPr>
+            <p:ph type="title"/>
+          </p:nvPr>
+        </p:nvSpPr>
+        <p:spPr/>
+        <p:txBody>
+          <a:bodyPr/>
+          <a:lstStyle/>
+          <a:p>
+            <a:r>
+              <a:rPr lang="en-US" dirty="0" smtClean="0"/>
+              <a:t>File IO: File Operations Examples</a:t>
+            </a:r>
+            <a:endParaRPr lang="en-US" dirty="0"/>
+          </a:p>
+        </p:txBody>
+      </p:sp>
+    </p:spTree>
+    <p:extLst>
+      <p:ext uri="{BB962C8B-B14F-4D97-AF65-F5344CB8AC3E}">
+        <p14:creationId xmlns:p14="http://schemas.microsoft.com/office/powerpoint/2010/main" val="347953696"/>
+      </p:ext>
+    </p:extLst>
+  </p:cSld>
+  <p:clrMapOvr>
+    <a:masterClrMapping/>
+  </p:clrMapOvr>
+  <p:timing>
+    <p:tnLst>
+      <p:par>
+        <p:cTn id="1" dur="indefinite" restart="never" nodeType="tmRoot"/>
+      </p:par>
+    </p:tnLst>
+  </p:timing>
+</p:sld>
+</file>
+
+<file path=ppt/slides/slide91.xml><?xml version="1.0" encoding="utf-8"?>
+<p:sld xmlns:a="http://schemas.openxmlformats.org/drawingml/2006/main" xmlns:r="http://schemas.openxmlformats.org/officeDocument/2006/relationships" xmlns:p="http://schemas.openxmlformats.org/presentationml/2006/main">
+  <p:cSld>
+    <p:spTree>
+      <p:nvGrpSpPr>
+        <p:cNvPr id="1" name=""/>
+        <p:cNvGrpSpPr/>
+        <p:nvPr/>
+      </p:nvGrpSpPr>
+      <p:grpSpPr>
+        <a:xfrm>
+          <a:off x="0" y="0"/>
+          <a:ext cx="0" cy="0"/>
+          <a:chOff x="0" y="0"/>
+          <a:chExt cx="0" cy="0"/>
+        </a:xfrm>
+      </p:grpSpPr>
+      <p:sp>
+        <p:nvSpPr>
+          <p:cNvPr id="4" name="Title 3"/>
+          <p:cNvSpPr>
+            <a:spLocks noGrp="1"/>
+          </p:cNvSpPr>
+          <p:nvPr>
+            <p:ph type="title"/>
+          </p:nvPr>
+        </p:nvSpPr>
+        <p:spPr/>
+        <p:txBody>
+          <a:bodyPr>
+            <a:normAutofit/>
+          </a:bodyPr>
+          <a:lstStyle/>
+          <a:p>
+            <a:r>
+              <a:rPr lang="en-US" dirty="0" smtClean="0">
+                <a:solidFill>
+                  <a:srgbClr val="C4A174"/>
+                </a:solidFill>
+              </a:rPr>
+              <a:t>Exercise:</a:t>
+            </a:r>
+            <a:r>
+              <a:rPr lang="en-US" dirty="0" smtClean="0"/>
+              <a:t> </a:t>
+            </a:r>
+            <a:r>
+              <a:rPr lang="en-US" dirty="0" smtClean="0"/>
+              <a:t>File Operations</a:t>
+            </a:r>
+            <a:endParaRPr lang="en-US" dirty="0"/>
+          </a:p>
+        </p:txBody>
+      </p:sp>
+    </p:spTree>
+    <p:extLst>
+      <p:ext uri="{BB962C8B-B14F-4D97-AF65-F5344CB8AC3E}">
+        <p14:creationId xmlns:p14="http://schemas.microsoft.com/office/powerpoint/2010/main" val="1034857759"/>
+      </p:ext>
+    </p:extLst>
+  </p:cSld>
+  <p:clrMapOvr>
+    <a:masterClrMapping/>
+  </p:clrMapOvr>
+  <p:timing>
+    <p:tnLst>
+      <p:par>
+        <p:cTn id="1" dur="indefinite" restart="never" nodeType="tmRoot"/>
+      </p:par>
+    </p:tnLst>
+  </p:timing>
+</p:sld>
+</file>
+
+<file path=ppt/slides/slide92.xml><?xml version="1.0" encoding="utf-8"?>
+<p:sld xmlns:a="http://schemas.openxmlformats.org/drawingml/2006/main" xmlns:r="http://schemas.openxmlformats.org/officeDocument/2006/relationships" xmlns:p="http://schemas.openxmlformats.org/presentationml/2006/main">
+  <p:cSld>
+    <p:bg>
+      <p:bgPr>
+        <a:solidFill>
+          <a:schemeClr val="bg1"/>
+        </a:solidFill>
+        <a:effectLst/>
+      </p:bgPr>
+    </p:bg>
+    <p:spTree>
+      <p:nvGrpSpPr>
+        <p:cNvPr id="1" name=""/>
+        <p:cNvGrpSpPr/>
+        <p:nvPr/>
+      </p:nvGrpSpPr>
+      <p:grpSpPr>
+        <a:xfrm>
+          <a:off x="0" y="0"/>
+          <a:ext cx="0" cy="0"/>
+          <a:chOff x="0" y="0"/>
+          <a:chExt cx="0" cy="0"/>
+        </a:xfrm>
+      </p:grpSpPr>
+      <p:sp>
+        <p:nvSpPr>
+          <p:cNvPr id="4" name="Content Placeholder 3"/>
+          <p:cNvSpPr>
+            <a:spLocks noGrp="1"/>
+          </p:cNvSpPr>
+          <p:nvPr>
+            <p:ph idx="1"/>
+          </p:nvPr>
+        </p:nvSpPr>
+        <p:spPr/>
+        <p:txBody>
+          <a:bodyPr/>
+          <a:lstStyle/>
+          <a:p>
+            <a:endParaRPr lang="en-US" dirty="0"/>
+          </a:p>
+        </p:txBody>
+      </p:sp>
+      <p:sp>
+        <p:nvSpPr>
+          <p:cNvPr id="3" name="Title 2"/>
+          <p:cNvSpPr>
+            <a:spLocks noGrp="1"/>
+          </p:cNvSpPr>
+          <p:nvPr>
+            <p:ph type="title"/>
+          </p:nvPr>
+        </p:nvSpPr>
+        <p:spPr/>
+        <p:txBody>
+          <a:bodyPr/>
+          <a:lstStyle/>
+          <a:p>
+            <a:endParaRPr lang="en-US"/>
+          </a:p>
+        </p:txBody>
+      </p:sp>
+    </p:spTree>
+    <p:extLst>
+      <p:ext uri="{BB962C8B-B14F-4D97-AF65-F5344CB8AC3E}">
+        <p14:creationId xmlns:p14="http://schemas.microsoft.com/office/powerpoint/2010/main" val="906518440"/>
+      </p:ext>
+    </p:extLst>
+  </p:cSld>
+  <p:clrMapOvr>
+    <a:masterClrMapping/>
+  </p:clrMapOvr>
+  <p:timing>
+    <p:tnLst>
+      <p:par>
+        <p:cTn id="1" dur="indefinite" restart="never" nodeType="tmRoot"/>
+      </p:par>
+    </p:tnLst>
+  </p:timing>
+</p:sld>
+</file>
+
+<file path=ppt/slides/slide93.xml><?xml version="1.0" encoding="utf-8"?>
+<p:sld xmlns:a="http://schemas.openxmlformats.org/drawingml/2006/main" xmlns:r="http://schemas.openxmlformats.org/officeDocument/2006/relationships" xmlns:p="http://schemas.openxmlformats.org/presentationml/2006/main">
+  <p:cSld>
+    <p:bg>
+      <p:bgPr>
+        <a:solidFill>
+          <a:schemeClr val="bg1"/>
+        </a:solidFill>
+        <a:effectLst/>
+      </p:bgPr>
+    </p:bg>
+    <p:spTree>
+      <p:nvGrpSpPr>
+        <p:cNvPr id="1" name=""/>
+        <p:cNvGrpSpPr/>
+        <p:nvPr/>
+      </p:nvGrpSpPr>
+      <p:grpSpPr>
+        <a:xfrm>
+          <a:off x="0" y="0"/>
+          <a:ext cx="0" cy="0"/>
+          <a:chOff x="0" y="0"/>
+          <a:chExt cx="0" cy="0"/>
+        </a:xfrm>
+      </p:grpSpPr>
+      <p:sp>
+        <p:nvSpPr>
+          <p:cNvPr id="4" name="Content Placeholder 3"/>
+          <p:cNvSpPr>
+            <a:spLocks noGrp="1"/>
+          </p:cNvSpPr>
+          <p:nvPr>
+            <p:ph idx="1"/>
+          </p:nvPr>
+        </p:nvSpPr>
+        <p:spPr/>
+        <p:txBody>
+          <a:bodyPr/>
+          <a:lstStyle/>
+          <a:p>
+            <a:endParaRPr lang="en-US" dirty="0"/>
+          </a:p>
+        </p:txBody>
+      </p:sp>
+      <p:sp>
+        <p:nvSpPr>
+          <p:cNvPr id="3" name="Title 2"/>
+          <p:cNvSpPr>
+            <a:spLocks noGrp="1"/>
+          </p:cNvSpPr>
+          <p:nvPr>
+            <p:ph type="title"/>
+          </p:nvPr>
+        </p:nvSpPr>
+        <p:spPr/>
+        <p:txBody>
+          <a:bodyPr/>
+          <a:lstStyle/>
+          <a:p>
+            <a:endParaRPr lang="en-US"/>
+          </a:p>
+        </p:txBody>
+      </p:sp>
+    </p:spTree>
+    <p:extLst>
+      <p:ext uri="{BB962C8B-B14F-4D97-AF65-F5344CB8AC3E}">
+        <p14:creationId xmlns:p14="http://schemas.microsoft.com/office/powerpoint/2010/main" val="2774228623"/>
       </p:ext>
     </p:extLst>
   </p:cSld>

</xml_diff>